<commit_message>
git slide outline added
</commit_message>
<xml_diff>
--- a/slides/git_slides.pptx
+++ b/slides/git_slides.pptx
@@ -5,16 +5,15 @@
     <p:sldMasterId id="2147483648" r:id="rId1"/>
   </p:sldMasterIdLst>
   <p:notesMasterIdLst>
-    <p:notesMasterId r:id="rId9"/>
+    <p:notesMasterId r:id="rId8"/>
   </p:notesMasterIdLst>
   <p:sldIdLst>
     <p:sldId id="420" r:id="rId2"/>
     <p:sldId id="419" r:id="rId3"/>
     <p:sldId id="421" r:id="rId4"/>
     <p:sldId id="422" r:id="rId5"/>
-    <p:sldId id="423" r:id="rId6"/>
-    <p:sldId id="424" r:id="rId7"/>
-    <p:sldId id="425" r:id="rId8"/>
+    <p:sldId id="424" r:id="rId6"/>
+    <p:sldId id="425" r:id="rId7"/>
   </p:sldIdLst>
   <p:sldSz cx="12192000" cy="6858000"/>
   <p:notesSz cx="6858000" cy="9144000"/>
@@ -4041,16 +4040,108 @@
           </a:bodyPr>
           <a:lstStyle/>
           <a:p>
-            <a:pPr marL="0" indent="0">
-              <a:buNone/>
-            </a:pPr>
+            <a:r>
+              <a:rPr lang="en-US" sz="2400" dirty="0">
+                <a:latin typeface="Arial" panose="020B0604020202020204" pitchFamily="34" charset="0"/>
+                <a:cs typeface="Arial" panose="020B0604020202020204" pitchFamily="34" charset="0"/>
+              </a:rPr>
+              <a:t>Version control</a:t>
+            </a:r>
+          </a:p>
+          <a:p>
+            <a:r>
+              <a:rPr lang="en-US" sz="2400" dirty="0">
+                <a:latin typeface="Arial" panose="020B0604020202020204" pitchFamily="34" charset="0"/>
+                <a:cs typeface="Arial" panose="020B0604020202020204" pitchFamily="34" charset="0"/>
+              </a:rPr>
+              <a:t>Collaboration</a:t>
+            </a:r>
+          </a:p>
+          <a:p>
+            <a:r>
+              <a:rPr lang="en-US" sz="2400" dirty="0">
+                <a:latin typeface="Arial" panose="020B0604020202020204" pitchFamily="34" charset="0"/>
+                <a:cs typeface="Arial" panose="020B0604020202020204" pitchFamily="34" charset="0"/>
+              </a:rPr>
+              <a:t>Accountability</a:t>
+            </a:r>
+          </a:p>
+          <a:p>
             <a:endParaRPr lang="en-US" sz="2400" dirty="0">
               <a:latin typeface="Arial" panose="020B0604020202020204" pitchFamily="34" charset="0"/>
               <a:cs typeface="Arial" panose="020B0604020202020204" pitchFamily="34" charset="0"/>
             </a:endParaRPr>
           </a:p>
-        </p:txBody>
-      </p:sp>
+          <a:p>
+            <a:endParaRPr lang="en-US" sz="2400" dirty="0">
+              <a:latin typeface="Arial" panose="020B0604020202020204" pitchFamily="34" charset="0"/>
+              <a:cs typeface="Arial" panose="020B0604020202020204" pitchFamily="34" charset="0"/>
+            </a:endParaRPr>
+          </a:p>
+          <a:p>
+            <a:endParaRPr lang="en-US" sz="2400" dirty="0">
+              <a:latin typeface="Arial" panose="020B0604020202020204" pitchFamily="34" charset="0"/>
+              <a:cs typeface="Arial" panose="020B0604020202020204" pitchFamily="34" charset="0"/>
+            </a:endParaRPr>
+          </a:p>
+          <a:p>
+            <a:r>
+              <a:rPr lang="en-US" sz="2400" dirty="0">
+                <a:latin typeface="Arial" panose="020B0604020202020204" pitchFamily="34" charset="0"/>
+                <a:cs typeface="Arial" panose="020B0604020202020204" pitchFamily="34" charset="0"/>
+              </a:rPr>
+              <a:t>git vs. GitHub</a:t>
+            </a:r>
+          </a:p>
+        </p:txBody>
+      </p:sp>
+      <p:pic>
+        <p:nvPicPr>
+          <p:cNvPr id="1026" name="Picture 2" descr="Git">
+            <a:extLst>
+              <a:ext uri="{FF2B5EF4-FFF2-40B4-BE49-F238E27FC236}">
+                <a16:creationId xmlns:a16="http://schemas.microsoft.com/office/drawing/2014/main" id="{E67D52A9-59BA-D918-6404-F42C1D2D049A}"/>
+              </a:ext>
+            </a:extLst>
+          </p:cNvPr>
+          <p:cNvPicPr>
+            <a:picLocks noChangeAspect="1" noChangeArrowheads="1"/>
+          </p:cNvPicPr>
+          <p:nvPr/>
+        </p:nvPicPr>
+        <p:blipFill>
+          <a:blip r:embed="rId2">
+            <a:extLst>
+              <a:ext uri="{28A0092B-C50C-407E-A947-70E740481C1C}">
+                <a14:useLocalDpi xmlns:a14="http://schemas.microsoft.com/office/drawing/2010/main" val="0"/>
+              </a:ext>
+            </a:extLst>
+          </a:blip>
+          <a:srcRect/>
+          <a:stretch>
+            <a:fillRect/>
+          </a:stretch>
+        </p:blipFill>
+        <p:spPr bwMode="auto">
+          <a:xfrm>
+            <a:off x="7756071" y="787400"/>
+            <a:ext cx="4191000" cy="6070600"/>
+          </a:xfrm>
+          <a:prstGeom prst="rect">
+            <a:avLst/>
+          </a:prstGeom>
+          <a:noFill/>
+          <a:extLst>
+            <a:ext uri="{909E8E84-426E-40DD-AFC4-6F175D3DCCD1}">
+              <a14:hiddenFill xmlns:a14="http://schemas.microsoft.com/office/drawing/2010/main">
+                <a:solidFill>
+                  <a:srgbClr val="FFFFFF"/>
+                </a:solidFill>
+              </a14:hiddenFill>
+            </a:ext>
+          </a:extLst>
+        </p:spPr>
+      </p:pic>
     </p:spTree>
     <p:extLst>
       <p:ext uri="{BB962C8B-B14F-4D97-AF65-F5344CB8AC3E}">
@@ -4217,10 +4308,85 @@
           </a:bodyPr>
           <a:lstStyle/>
           <a:p>
-            <a:pPr marL="0" indent="0">
-              <a:buNone/>
-            </a:pPr>
-            <a:endParaRPr lang="en-US" sz="2400" dirty="0">
+            <a:r>
+              <a:rPr lang="en-US" sz="2400" dirty="0">
+                <a:latin typeface="Arial" panose="020B0604020202020204" pitchFamily="34" charset="0"/>
+                <a:cs typeface="Arial" panose="020B0604020202020204" pitchFamily="34" charset="0"/>
+              </a:rPr>
+              <a:t>Repositories</a:t>
+            </a:r>
+          </a:p>
+          <a:p>
+            <a:pPr lvl="1"/>
+            <a:r>
+              <a:rPr lang="en-US" sz="2000" dirty="0">
+                <a:latin typeface="Arial" panose="020B0604020202020204" pitchFamily="34" charset="0"/>
+                <a:cs typeface="Arial" panose="020B0604020202020204" pitchFamily="34" charset="0"/>
+              </a:rPr>
+              <a:t>README</a:t>
+            </a:r>
+          </a:p>
+          <a:p>
+            <a:pPr lvl="1"/>
+            <a:r>
+              <a:rPr lang="en-US" sz="2000" dirty="0">
+                <a:latin typeface="Arial" panose="020B0604020202020204" pitchFamily="34" charset="0"/>
+                <a:cs typeface="Arial" panose="020B0604020202020204" pitchFamily="34" charset="0"/>
+              </a:rPr>
+              <a:t>.</a:t>
+            </a:r>
+            <a:r>
+              <a:rPr lang="en-US" sz="2000" dirty="0" err="1">
+                <a:latin typeface="Arial" panose="020B0604020202020204" pitchFamily="34" charset="0"/>
+                <a:cs typeface="Arial" panose="020B0604020202020204" pitchFamily="34" charset="0"/>
+              </a:rPr>
+              <a:t>gitignore</a:t>
+            </a:r>
+            <a:endParaRPr lang="en-US" sz="2000" dirty="0">
+              <a:latin typeface="Arial" panose="020B0604020202020204" pitchFamily="34" charset="0"/>
+              <a:cs typeface="Arial" panose="020B0604020202020204" pitchFamily="34" charset="0"/>
+            </a:endParaRPr>
+          </a:p>
+          <a:p>
+            <a:r>
+              <a:rPr lang="en-US" sz="2400" dirty="0">
+                <a:latin typeface="Arial" panose="020B0604020202020204" pitchFamily="34" charset="0"/>
+                <a:cs typeface="Arial" panose="020B0604020202020204" pitchFamily="34" charset="0"/>
+              </a:rPr>
+              <a:t>Branches</a:t>
+            </a:r>
+          </a:p>
+          <a:p>
+            <a:pPr lvl="1"/>
+            <a:r>
+              <a:rPr lang="en-US" sz="2000" dirty="0">
+                <a:latin typeface="Arial" panose="020B0604020202020204" pitchFamily="34" charset="0"/>
+                <a:cs typeface="Arial" panose="020B0604020202020204" pitchFamily="34" charset="0"/>
+              </a:rPr>
+              <a:t>Main</a:t>
+            </a:r>
+          </a:p>
+          <a:p>
+            <a:r>
+              <a:rPr lang="en-US" sz="2400" dirty="0">
+                <a:latin typeface="Arial" panose="020B0604020202020204" pitchFamily="34" charset="0"/>
+                <a:cs typeface="Arial" panose="020B0604020202020204" pitchFamily="34" charset="0"/>
+              </a:rPr>
+              <a:t>Pull Requests</a:t>
+            </a:r>
+          </a:p>
+          <a:p>
+            <a:r>
+              <a:rPr lang="en-US" sz="2400" dirty="0">
+                <a:latin typeface="Arial" panose="020B0604020202020204" pitchFamily="34" charset="0"/>
+                <a:cs typeface="Arial" panose="020B0604020202020204" pitchFamily="34" charset="0"/>
+              </a:rPr>
+              <a:t>Commit history</a:t>
+            </a:r>
+          </a:p>
+          <a:p>
+            <a:pPr lvl="1"/>
+            <a:endParaRPr lang="en-US" sz="2000" dirty="0">
               <a:latin typeface="Arial" panose="020B0604020202020204" pitchFamily="34" charset="0"/>
               <a:cs typeface="Arial" panose="020B0604020202020204" pitchFamily="34" charset="0"/>
             </a:endParaRPr>
@@ -4357,7 +4523,7 @@
                 <a:latin typeface="Arial" panose="020B0604020202020204" pitchFamily="34" charset="0"/>
                 <a:cs typeface="Arial" panose="020B0604020202020204" pitchFamily="34" charset="0"/>
               </a:rPr>
-              <a:t>How to get and edit code from GitHub?</a:t>
+              <a:t>How to get, edit, and push?</a:t>
             </a:r>
           </a:p>
         </p:txBody>
@@ -4396,10 +4562,118 @@
             <a:pPr marL="0" indent="0">
               <a:buNone/>
             </a:pPr>
+            <a:r>
+              <a:rPr lang="en-US" sz="2400" dirty="0">
+                <a:latin typeface="Arial" panose="020B0604020202020204" pitchFamily="34" charset="0"/>
+                <a:cs typeface="Arial" panose="020B0604020202020204" pitchFamily="34" charset="0"/>
+              </a:rPr>
+              <a:t>git clone &lt;REPO LINK&gt;</a:t>
+            </a:r>
+          </a:p>
+          <a:p>
+            <a:pPr marL="0" indent="0">
+              <a:buNone/>
+            </a:pPr>
             <a:endParaRPr lang="en-US" sz="2400" dirty="0">
               <a:latin typeface="Arial" panose="020B0604020202020204" pitchFamily="34" charset="0"/>
               <a:cs typeface="Arial" panose="020B0604020202020204" pitchFamily="34" charset="0"/>
             </a:endParaRPr>
+          </a:p>
+          <a:p>
+            <a:pPr marL="0" indent="0">
+              <a:buNone/>
+            </a:pPr>
+            <a:r>
+              <a:rPr lang="en-US" sz="2400" dirty="0">
+                <a:latin typeface="Arial" panose="020B0604020202020204" pitchFamily="34" charset="0"/>
+                <a:cs typeface="Arial" panose="020B0604020202020204" pitchFamily="34" charset="0"/>
+              </a:rPr>
+              <a:t>git status</a:t>
+            </a:r>
+          </a:p>
+          <a:p>
+            <a:pPr marL="0" indent="0">
+              <a:buNone/>
+            </a:pPr>
+            <a:endParaRPr lang="en-US" sz="2400" dirty="0">
+              <a:latin typeface="Arial" panose="020B0604020202020204" pitchFamily="34" charset="0"/>
+              <a:cs typeface="Arial" panose="020B0604020202020204" pitchFamily="34" charset="0"/>
+            </a:endParaRPr>
+          </a:p>
+          <a:p>
+            <a:pPr marL="0" indent="0">
+              <a:buNone/>
+            </a:pPr>
+            <a:r>
+              <a:rPr lang="en-US" sz="2400" dirty="0">
+                <a:latin typeface="Arial" panose="020B0604020202020204" pitchFamily="34" charset="0"/>
+                <a:cs typeface="Arial" panose="020B0604020202020204" pitchFamily="34" charset="0"/>
+              </a:rPr>
+              <a:t>git add &lt;FILEPATH&gt;</a:t>
+            </a:r>
+          </a:p>
+          <a:p>
+            <a:pPr marL="0" indent="0">
+              <a:buNone/>
+            </a:pPr>
+            <a:endParaRPr lang="en-US" sz="2400" dirty="0">
+              <a:latin typeface="Arial" panose="020B0604020202020204" pitchFamily="34" charset="0"/>
+              <a:cs typeface="Arial" panose="020B0604020202020204" pitchFamily="34" charset="0"/>
+            </a:endParaRPr>
+          </a:p>
+          <a:p>
+            <a:pPr marL="0" indent="0">
+              <a:buNone/>
+            </a:pPr>
+            <a:r>
+              <a:rPr lang="en-US" sz="2400" dirty="0">
+                <a:latin typeface="Arial" panose="020B0604020202020204" pitchFamily="34" charset="0"/>
+                <a:cs typeface="Arial" panose="020B0604020202020204" pitchFamily="34" charset="0"/>
+              </a:rPr>
+              <a:t>git commit –m &lt;MESSAGE&gt;</a:t>
+            </a:r>
+          </a:p>
+          <a:p>
+            <a:pPr marL="0" indent="0">
+              <a:buNone/>
+            </a:pPr>
+            <a:endParaRPr lang="en-US" sz="2400" dirty="0">
+              <a:latin typeface="Arial" panose="020B0604020202020204" pitchFamily="34" charset="0"/>
+              <a:cs typeface="Arial" panose="020B0604020202020204" pitchFamily="34" charset="0"/>
+            </a:endParaRPr>
+          </a:p>
+          <a:p>
+            <a:pPr marL="0" indent="0">
+              <a:buNone/>
+            </a:pPr>
+            <a:r>
+              <a:rPr lang="en-US" sz="2400" dirty="0">
+                <a:latin typeface="Arial" panose="020B0604020202020204" pitchFamily="34" charset="0"/>
+                <a:cs typeface="Arial" panose="020B0604020202020204" pitchFamily="34" charset="0"/>
+              </a:rPr>
+              <a:t>git push</a:t>
+            </a:r>
+          </a:p>
+          <a:p>
+            <a:pPr marL="0" indent="0">
+              <a:buNone/>
+            </a:pPr>
+            <a:endParaRPr lang="en-US" sz="2400" dirty="0">
+              <a:latin typeface="Arial" panose="020B0604020202020204" pitchFamily="34" charset="0"/>
+              <a:cs typeface="Arial" panose="020B0604020202020204" pitchFamily="34" charset="0"/>
+            </a:endParaRPr>
+          </a:p>
+          <a:p>
+            <a:pPr marL="0" indent="0">
+              <a:buNone/>
+            </a:pPr>
+            <a:r>
+              <a:rPr lang="en-US" sz="2400" dirty="0">
+                <a:latin typeface="Arial" panose="020B0604020202020204" pitchFamily="34" charset="0"/>
+                <a:cs typeface="Arial" panose="020B0604020202020204" pitchFamily="34" charset="0"/>
+              </a:rPr>
+              <a:t>git pull</a:t>
+            </a:r>
           </a:p>
         </p:txBody>
       </p:sp>
@@ -4417,182 +4691,6 @@
 </file>
 
 <file path=ppt/slides/slide5.xml><?xml version="1.0" encoding="utf-8"?>
-<p:sld xmlns:a="http://schemas.openxmlformats.org/drawingml/2006/main" xmlns:r="http://schemas.openxmlformats.org/officeDocument/2006/relationships" xmlns:p="http://schemas.openxmlformats.org/presentationml/2006/main">
-  <p:cSld>
-    <p:spTree>
-      <p:nvGrpSpPr>
-        <p:cNvPr id="1" name="">
-          <a:extLst>
-            <a:ext uri="{FF2B5EF4-FFF2-40B4-BE49-F238E27FC236}">
-              <a16:creationId xmlns:a16="http://schemas.microsoft.com/office/drawing/2014/main" id="{16C6D51D-9110-E3B8-5B8F-00CAA1DAA0C3}"/>
-            </a:ext>
-          </a:extLst>
-        </p:cNvPr>
-        <p:cNvGrpSpPr/>
-        <p:nvPr/>
-      </p:nvGrpSpPr>
-      <p:grpSpPr>
-        <a:xfrm>
-          <a:off x="0" y="0"/>
-          <a:ext cx="0" cy="0"/>
-          <a:chOff x="0" y="0"/>
-          <a:chExt cx="0" cy="0"/>
-        </a:xfrm>
-      </p:grpSpPr>
-      <p:sp>
-        <p:nvSpPr>
-          <p:cNvPr id="5" name="Slide Number Placeholder 4">
-            <a:extLst>
-              <a:ext uri="{FF2B5EF4-FFF2-40B4-BE49-F238E27FC236}">
-                <a16:creationId xmlns:a16="http://schemas.microsoft.com/office/drawing/2014/main" id="{47D47151-1208-1945-F38D-42CBF43972CC}"/>
-              </a:ext>
-            </a:extLst>
-          </p:cNvPr>
-          <p:cNvSpPr>
-            <a:spLocks noGrp="1"/>
-          </p:cNvSpPr>
-          <p:nvPr>
-            <p:ph type="sldNum" sz="quarter" idx="12"/>
-          </p:nvPr>
-        </p:nvSpPr>
-        <p:spPr>
-          <a:xfrm>
-            <a:off x="11702143" y="6554206"/>
-            <a:ext cx="489857" cy="365125"/>
-          </a:xfrm>
-        </p:spPr>
-        <p:txBody>
-          <a:bodyPr/>
-          <a:lstStyle/>
-          <a:p>
-            <a:r>
-              <a:rPr lang="en-US" dirty="0">
-                <a:latin typeface="Arial" panose="020B0604020202020204" pitchFamily="34" charset="0"/>
-                <a:cs typeface="Arial" panose="020B0604020202020204" pitchFamily="34" charset="0"/>
-              </a:rPr>
-              <a:t>1</a:t>
-            </a:r>
-          </a:p>
-        </p:txBody>
-      </p:sp>
-      <p:sp>
-        <p:nvSpPr>
-          <p:cNvPr id="8" name="Title 1">
-            <a:extLst>
-              <a:ext uri="{FF2B5EF4-FFF2-40B4-BE49-F238E27FC236}">
-                <a16:creationId xmlns:a16="http://schemas.microsoft.com/office/drawing/2014/main" id="{C79F4AE0-3584-DFBF-E611-05A8B53E39EC}"/>
-              </a:ext>
-            </a:extLst>
-          </p:cNvPr>
-          <p:cNvSpPr txBox="1">
-            <a:spLocks/>
-          </p:cNvSpPr>
-          <p:nvPr/>
-        </p:nvSpPr>
-        <p:spPr>
-          <a:xfrm>
-            <a:off x="76199" y="42862"/>
-            <a:ext cx="12039600" cy="701675"/>
-          </a:xfrm>
-          <a:prstGeom prst="rect">
-            <a:avLst/>
-          </a:prstGeom>
-          <a:solidFill>
-            <a:schemeClr val="tx2">
-              <a:lumMod val="10000"/>
-              <a:lumOff val="90000"/>
-            </a:schemeClr>
-          </a:solidFill>
-        </p:spPr>
-        <p:txBody>
-          <a:bodyPr vert="horz" lIns="91440" tIns="45720" rIns="91440" bIns="45720" rtlCol="0" anchor="ctr">
-            <a:normAutofit/>
-          </a:bodyPr>
-          <a:lstStyle>
-            <a:lvl1pPr algn="l" defTabSz="914400" rtl="0" eaLnBrk="1" latinLnBrk="0" hangingPunct="1">
-              <a:lnSpc>
-                <a:spcPct val="90000"/>
-              </a:lnSpc>
-              <a:spcBef>
-                <a:spcPct val="0"/>
-              </a:spcBef>
-              <a:buNone/>
-              <a:defRPr sz="4400" kern="1200">
-                <a:solidFill>
-                  <a:schemeClr val="tx1"/>
-                </a:solidFill>
-                <a:latin typeface="+mj-lt"/>
-                <a:ea typeface="+mj-ea"/>
-                <a:cs typeface="+mj-cs"/>
-              </a:defRPr>
-            </a:lvl1pPr>
-          </a:lstStyle>
-          <a:p>
-            <a:r>
-              <a:rPr lang="en-US" sz="4000" dirty="0">
-                <a:latin typeface="Arial" panose="020B0604020202020204" pitchFamily="34" charset="0"/>
-                <a:cs typeface="Arial" panose="020B0604020202020204" pitchFamily="34" charset="0"/>
-              </a:rPr>
-              <a:t>How to save code to GitHub?</a:t>
-            </a:r>
-          </a:p>
-        </p:txBody>
-      </p:sp>
-      <p:sp>
-        <p:nvSpPr>
-          <p:cNvPr id="13" name="Content Placeholder 2">
-            <a:extLst>
-              <a:ext uri="{FF2B5EF4-FFF2-40B4-BE49-F238E27FC236}">
-                <a16:creationId xmlns:a16="http://schemas.microsoft.com/office/drawing/2014/main" id="{FD55395A-AF1A-AC50-9751-9329A1F92DD7}"/>
-              </a:ext>
-            </a:extLst>
-          </p:cNvPr>
-          <p:cNvSpPr>
-            <a:spLocks noGrp="1"/>
-          </p:cNvSpPr>
-          <p:nvPr>
-            <p:ph idx="1"/>
-          </p:nvPr>
-        </p:nvSpPr>
-        <p:spPr>
-          <a:xfrm>
-            <a:off x="76199" y="851581"/>
-            <a:ext cx="12039600" cy="5731300"/>
-          </a:xfrm>
-          <a:ln>
-            <a:noFill/>
-          </a:ln>
-        </p:spPr>
-        <p:txBody>
-          <a:bodyPr>
-            <a:normAutofit/>
-          </a:bodyPr>
-          <a:lstStyle/>
-          <a:p>
-            <a:pPr marL="0" indent="0">
-              <a:buNone/>
-            </a:pPr>
-            <a:endParaRPr lang="en-US" sz="2400" dirty="0">
-              <a:latin typeface="Arial" panose="020B0604020202020204" pitchFamily="34" charset="0"/>
-              <a:cs typeface="Arial" panose="020B0604020202020204" pitchFamily="34" charset="0"/>
-            </a:endParaRPr>
-          </a:p>
-        </p:txBody>
-      </p:sp>
-    </p:spTree>
-    <p:extLst>
-      <p:ext uri="{BB962C8B-B14F-4D97-AF65-F5344CB8AC3E}">
-        <p14:creationId xmlns:p14="http://schemas.microsoft.com/office/powerpoint/2010/main" val="1971395007"/>
-      </p:ext>
-    </p:extLst>
-  </p:cSld>
-  <p:clrMapOvr>
-    <a:masterClrMapping/>
-  </p:clrMapOvr>
-</p:sld>
-</file>
-
-<file path=ppt/slides/slide6.xml><?xml version="1.0" encoding="utf-8"?>
 <p:sld xmlns:a="http://schemas.openxmlformats.org/drawingml/2006/main" xmlns:r="http://schemas.openxmlformats.org/officeDocument/2006/relationships" xmlns:p="http://schemas.openxmlformats.org/presentationml/2006/main">
   <p:cSld>
     <p:spTree>
@@ -4748,6 +4846,69 @@
             <a:pPr marL="0" indent="0">
               <a:buNone/>
             </a:pPr>
+            <a:r>
+              <a:rPr lang="en-US" sz="2400" dirty="0">
+                <a:latin typeface="Arial" panose="020B0604020202020204" pitchFamily="34" charset="0"/>
+                <a:cs typeface="Arial" panose="020B0604020202020204" pitchFamily="34" charset="0"/>
+              </a:rPr>
+              <a:t>git branch</a:t>
+            </a:r>
+          </a:p>
+          <a:p>
+            <a:pPr marL="0" indent="0">
+              <a:buNone/>
+            </a:pPr>
+            <a:endParaRPr lang="en-US" sz="2400" dirty="0">
+              <a:latin typeface="Arial" panose="020B0604020202020204" pitchFamily="34" charset="0"/>
+              <a:cs typeface="Arial" panose="020B0604020202020204" pitchFamily="34" charset="0"/>
+            </a:endParaRPr>
+          </a:p>
+          <a:p>
+            <a:pPr marL="0" indent="0">
+              <a:buNone/>
+            </a:pPr>
+            <a:r>
+              <a:rPr lang="en-US" sz="2400" dirty="0">
+                <a:latin typeface="Arial" panose="020B0604020202020204" pitchFamily="34" charset="0"/>
+                <a:cs typeface="Arial" panose="020B0604020202020204" pitchFamily="34" charset="0"/>
+              </a:rPr>
+              <a:t>git checkout</a:t>
+            </a:r>
+          </a:p>
+          <a:p>
+            <a:pPr marL="0" indent="0">
+              <a:buNone/>
+            </a:pPr>
+            <a:endParaRPr lang="en-US" sz="2400" dirty="0">
+              <a:latin typeface="Arial" panose="020B0604020202020204" pitchFamily="34" charset="0"/>
+              <a:cs typeface="Arial" panose="020B0604020202020204" pitchFamily="34" charset="0"/>
+            </a:endParaRPr>
+          </a:p>
+          <a:p>
+            <a:pPr marL="0" indent="0">
+              <a:buNone/>
+            </a:pPr>
+            <a:r>
+              <a:rPr lang="en-US" sz="2400" dirty="0">
+                <a:latin typeface="Arial" panose="020B0604020202020204" pitchFamily="34" charset="0"/>
+                <a:cs typeface="Arial" panose="020B0604020202020204" pitchFamily="34" charset="0"/>
+              </a:rPr>
+              <a:t>Pull Requests</a:t>
+            </a:r>
+          </a:p>
+          <a:p>
+            <a:pPr marL="0" indent="0">
+              <a:buNone/>
+            </a:pPr>
+            <a:endParaRPr lang="en-US" sz="2400" dirty="0">
+              <a:latin typeface="Arial" panose="020B0604020202020204" pitchFamily="34" charset="0"/>
+              <a:cs typeface="Arial" panose="020B0604020202020204" pitchFamily="34" charset="0"/>
+            </a:endParaRPr>
+          </a:p>
+          <a:p>
+            <a:pPr marL="0" indent="0">
+              <a:buNone/>
+            </a:pPr>
             <a:endParaRPr lang="en-US" sz="2400" dirty="0">
               <a:latin typeface="Arial" panose="020B0604020202020204" pitchFamily="34" charset="0"/>
               <a:cs typeface="Arial" panose="020B0604020202020204" pitchFamily="34" charset="0"/>
@@ -4768,7 +4929,7 @@
 </p:sld>
 </file>
 
-<file path=ppt/slides/slide7.xml><?xml version="1.0" encoding="utf-8"?>
+<file path=ppt/slides/slide6.xml><?xml version="1.0" encoding="utf-8"?>
 <p:sld xmlns:a="http://schemas.openxmlformats.org/drawingml/2006/main" xmlns:r="http://schemas.openxmlformats.org/officeDocument/2006/relationships" xmlns:p="http://schemas.openxmlformats.org/presentationml/2006/main">
   <p:cSld>
     <p:spTree>
@@ -4921,13 +5082,63 @@
           </a:bodyPr>
           <a:lstStyle/>
           <a:p>
-            <a:pPr marL="0" indent="0">
-              <a:buNone/>
-            </a:pPr>
-            <a:endParaRPr lang="en-US" sz="2400" dirty="0">
-              <a:latin typeface="Arial" panose="020B0604020202020204" pitchFamily="34" charset="0"/>
-              <a:cs typeface="Arial" panose="020B0604020202020204" pitchFamily="34" charset="0"/>
-            </a:endParaRPr>
+            <a:r>
+              <a:rPr lang="en-US" sz="2400" b="1" dirty="0">
+                <a:latin typeface="Arial" panose="020B0604020202020204" pitchFamily="34" charset="0"/>
+                <a:cs typeface="Arial" panose="020B0604020202020204" pitchFamily="34" charset="0"/>
+              </a:rPr>
+              <a:t>Team</a:t>
+            </a:r>
+          </a:p>
+          <a:p>
+            <a:pPr lvl="1"/>
+            <a:r>
+              <a:rPr lang="en-US" dirty="0">
+                <a:latin typeface="Arial" panose="020B0604020202020204" pitchFamily="34" charset="0"/>
+                <a:cs typeface="Arial" panose="020B0604020202020204" pitchFamily="34" charset="0"/>
+              </a:rPr>
+              <a:t>James</a:t>
+            </a:r>
+          </a:p>
+          <a:p>
+            <a:pPr lvl="1"/>
+            <a:r>
+              <a:rPr lang="en-US" dirty="0">
+                <a:latin typeface="Arial" panose="020B0604020202020204" pitchFamily="34" charset="0"/>
+                <a:cs typeface="Arial" panose="020B0604020202020204" pitchFamily="34" charset="0"/>
+              </a:rPr>
+              <a:t>Iana</a:t>
+            </a:r>
+          </a:p>
+          <a:p>
+            <a:pPr lvl="1"/>
+            <a:r>
+              <a:rPr lang="en-US" dirty="0">
+                <a:latin typeface="Arial" panose="020B0604020202020204" pitchFamily="34" charset="0"/>
+                <a:cs typeface="Arial" panose="020B0604020202020204" pitchFamily="34" charset="0"/>
+              </a:rPr>
+              <a:t>Sydney</a:t>
+            </a:r>
+          </a:p>
+          <a:p>
+            <a:pPr lvl="1"/>
+            <a:r>
+              <a:rPr lang="en-US" dirty="0">
+                <a:latin typeface="Arial" panose="020B0604020202020204" pitchFamily="34" charset="0"/>
+                <a:cs typeface="Arial" panose="020B0604020202020204" pitchFamily="34" charset="0"/>
+              </a:rPr>
+              <a:t>Laura</a:t>
+            </a:r>
+          </a:p>
+          <a:p>
+            <a:pPr lvl="1"/>
+            <a:r>
+              <a:rPr lang="en-US" dirty="0">
+                <a:latin typeface="Arial" panose="020B0604020202020204" pitchFamily="34" charset="0"/>
+                <a:cs typeface="Arial" panose="020B0604020202020204" pitchFamily="34" charset="0"/>
+              </a:rPr>
+              <a:t>Alex</a:t>
+            </a:r>
           </a:p>
         </p:txBody>
       </p:sp>

</xml_diff>

<commit_message>
Added text to git intro slides.
</commit_message>
<xml_diff>
--- a/slides/git_slides.pptx
+++ b/slides/git_slides.pptx
@@ -5,15 +5,17 @@
     <p:sldMasterId id="2147483648" r:id="rId1"/>
   </p:sldMasterIdLst>
   <p:notesMasterIdLst>
-    <p:notesMasterId r:id="rId8"/>
+    <p:notesMasterId r:id="rId10"/>
   </p:notesMasterIdLst>
   <p:sldIdLst>
     <p:sldId id="420" r:id="rId2"/>
-    <p:sldId id="419" r:id="rId3"/>
-    <p:sldId id="421" r:id="rId4"/>
-    <p:sldId id="422" r:id="rId5"/>
-    <p:sldId id="424" r:id="rId6"/>
-    <p:sldId id="425" r:id="rId7"/>
+    <p:sldId id="426" r:id="rId3"/>
+    <p:sldId id="419" r:id="rId4"/>
+    <p:sldId id="427" r:id="rId5"/>
+    <p:sldId id="421" r:id="rId6"/>
+    <p:sldId id="422" r:id="rId7"/>
+    <p:sldId id="424" r:id="rId8"/>
+    <p:sldId id="425" r:id="rId9"/>
   </p:sldIdLst>
   <p:sldSz cx="12192000" cy="6858000"/>
   <p:notesSz cx="6858000" cy="9144000"/>
@@ -112,6 +114,11 @@
       </a:defRPr>
     </a:lvl9pPr>
   </p:defaultTextStyle>
+  <p:extLst>
+    <p:ext uri="{EFAFB233-063F-42B5-8137-9DF3F51BA10A}">
+      <p15:sldGuideLst xmlns:p15="http://schemas.microsoft.com/office/powerpoint/2012/main"/>
+    </p:ext>
+  </p:extLst>
 </p:presentation>
 </file>
 
@@ -197,7 +204,7 @@
           <a:p>
             <a:fld id="{421EDD44-FF23-7940-ADBC-6A5D558CD363}" type="datetimeFigureOut">
               <a:rPr lang="en-US" smtClean="0"/>
-              <a:t>8/18/25</a:t>
+              <a:t>8/26/25</a:t>
             </a:fld>
             <a:endParaRPr lang="en-US"/>
           </a:p>
@@ -719,7 +726,7 @@
           <a:p>
             <a:fld id="{0761A694-4DAF-3C4C-AEBE-06CA116FCE29}" type="datetimeFigureOut">
               <a:rPr lang="en-US" smtClean="0"/>
-              <a:t>8/18/25</a:t>
+              <a:t>8/26/25</a:t>
             </a:fld>
             <a:endParaRPr lang="en-US"/>
           </a:p>
@@ -917,7 +924,7 @@
           <a:p>
             <a:fld id="{0761A694-4DAF-3C4C-AEBE-06CA116FCE29}" type="datetimeFigureOut">
               <a:rPr lang="en-US" smtClean="0"/>
-              <a:t>8/18/25</a:t>
+              <a:t>8/26/25</a:t>
             </a:fld>
             <a:endParaRPr lang="en-US"/>
           </a:p>
@@ -1125,7 +1132,7 @@
           <a:p>
             <a:fld id="{0761A694-4DAF-3C4C-AEBE-06CA116FCE29}" type="datetimeFigureOut">
               <a:rPr lang="en-US" smtClean="0"/>
-              <a:t>8/18/25</a:t>
+              <a:t>8/26/25</a:t>
             </a:fld>
             <a:endParaRPr lang="en-US"/>
           </a:p>
@@ -1323,7 +1330,7 @@
           <a:p>
             <a:fld id="{0761A694-4DAF-3C4C-AEBE-06CA116FCE29}" type="datetimeFigureOut">
               <a:rPr lang="en-US" smtClean="0"/>
-              <a:t>8/18/25</a:t>
+              <a:t>8/26/25</a:t>
             </a:fld>
             <a:endParaRPr lang="en-US"/>
           </a:p>
@@ -1598,7 +1605,7 @@
           <a:p>
             <a:fld id="{0761A694-4DAF-3C4C-AEBE-06CA116FCE29}" type="datetimeFigureOut">
               <a:rPr lang="en-US" smtClean="0"/>
-              <a:t>8/18/25</a:t>
+              <a:t>8/26/25</a:t>
             </a:fld>
             <a:endParaRPr lang="en-US"/>
           </a:p>
@@ -1863,7 +1870,7 @@
           <a:p>
             <a:fld id="{0761A694-4DAF-3C4C-AEBE-06CA116FCE29}" type="datetimeFigureOut">
               <a:rPr lang="en-US" smtClean="0"/>
-              <a:t>8/18/25</a:t>
+              <a:t>8/26/25</a:t>
             </a:fld>
             <a:endParaRPr lang="en-US"/>
           </a:p>
@@ -2275,7 +2282,7 @@
           <a:p>
             <a:fld id="{0761A694-4DAF-3C4C-AEBE-06CA116FCE29}" type="datetimeFigureOut">
               <a:rPr lang="en-US" smtClean="0"/>
-              <a:t>8/18/25</a:t>
+              <a:t>8/26/25</a:t>
             </a:fld>
             <a:endParaRPr lang="en-US"/>
           </a:p>
@@ -2416,7 +2423,7 @@
           <a:p>
             <a:fld id="{0761A694-4DAF-3C4C-AEBE-06CA116FCE29}" type="datetimeFigureOut">
               <a:rPr lang="en-US" smtClean="0"/>
-              <a:t>8/18/25</a:t>
+              <a:t>8/26/25</a:t>
             </a:fld>
             <a:endParaRPr lang="en-US"/>
           </a:p>
@@ -2529,7 +2536,7 @@
           <a:p>
             <a:fld id="{0761A694-4DAF-3C4C-AEBE-06CA116FCE29}" type="datetimeFigureOut">
               <a:rPr lang="en-US" smtClean="0"/>
-              <a:t>8/18/25</a:t>
+              <a:t>8/26/25</a:t>
             </a:fld>
             <a:endParaRPr lang="en-US"/>
           </a:p>
@@ -2840,7 +2847,7 @@
           <a:p>
             <a:fld id="{0761A694-4DAF-3C4C-AEBE-06CA116FCE29}" type="datetimeFigureOut">
               <a:rPr lang="en-US" smtClean="0"/>
-              <a:t>8/18/25</a:t>
+              <a:t>8/26/25</a:t>
             </a:fld>
             <a:endParaRPr lang="en-US"/>
           </a:p>
@@ -3128,7 +3135,7 @@
           <a:p>
             <a:fld id="{0761A694-4DAF-3C4C-AEBE-06CA116FCE29}" type="datetimeFigureOut">
               <a:rPr lang="en-US" smtClean="0"/>
-              <a:t>8/18/25</a:t>
+              <a:t>8/26/25</a:t>
             </a:fld>
             <a:endParaRPr lang="en-US"/>
           </a:p>
@@ -3369,7 +3376,7 @@
           <a:p>
             <a:fld id="{0761A694-4DAF-3C4C-AEBE-06CA116FCE29}" type="datetimeFigureOut">
               <a:rPr lang="en-US" smtClean="0"/>
-              <a:t>8/18/25</a:t>
+              <a:t>8/26/25</a:t>
             </a:fld>
             <a:endParaRPr lang="en-US"/>
           </a:p>
@@ -3895,6 +3902,286 @@
         <p:cNvPr id="1" name="">
           <a:extLst>
             <a:ext uri="{FF2B5EF4-FFF2-40B4-BE49-F238E27FC236}">
+              <a16:creationId xmlns:a16="http://schemas.microsoft.com/office/drawing/2014/main" id="{1D2DE029-28EA-81F7-0DFD-282FC676DD7D}"/>
+            </a:ext>
+          </a:extLst>
+        </p:cNvPr>
+        <p:cNvGrpSpPr/>
+        <p:nvPr/>
+      </p:nvGrpSpPr>
+      <p:grpSpPr>
+        <a:xfrm>
+          <a:off x="0" y="0"/>
+          <a:ext cx="0" cy="0"/>
+          <a:chOff x="0" y="0"/>
+          <a:chExt cx="0" cy="0"/>
+        </a:xfrm>
+      </p:grpSpPr>
+      <p:sp>
+        <p:nvSpPr>
+          <p:cNvPr id="5" name="Slide Number Placeholder 4">
+            <a:extLst>
+              <a:ext uri="{FF2B5EF4-FFF2-40B4-BE49-F238E27FC236}">
+                <a16:creationId xmlns:a16="http://schemas.microsoft.com/office/drawing/2014/main" id="{D6EF0275-2FFC-F46F-91D0-3E53EBCE169E}"/>
+              </a:ext>
+            </a:extLst>
+          </p:cNvPr>
+          <p:cNvSpPr>
+            <a:spLocks noGrp="1"/>
+          </p:cNvSpPr>
+          <p:nvPr>
+            <p:ph type="sldNum" sz="quarter" idx="12"/>
+          </p:nvPr>
+        </p:nvSpPr>
+        <p:spPr>
+          <a:xfrm>
+            <a:off x="11702143" y="6554206"/>
+            <a:ext cx="489857" cy="365125"/>
+          </a:xfrm>
+        </p:spPr>
+        <p:txBody>
+          <a:bodyPr/>
+          <a:lstStyle/>
+          <a:p>
+            <a:r>
+              <a:rPr lang="en-US" dirty="0">
+                <a:latin typeface="Arial" panose="020B0604020202020204" pitchFamily="34" charset="0"/>
+                <a:cs typeface="Arial" panose="020B0604020202020204" pitchFamily="34" charset="0"/>
+              </a:rPr>
+              <a:t>1</a:t>
+            </a:r>
+          </a:p>
+        </p:txBody>
+      </p:sp>
+      <p:sp>
+        <p:nvSpPr>
+          <p:cNvPr id="8" name="Title 1">
+            <a:extLst>
+              <a:ext uri="{FF2B5EF4-FFF2-40B4-BE49-F238E27FC236}">
+                <a16:creationId xmlns:a16="http://schemas.microsoft.com/office/drawing/2014/main" id="{8FAFD174-A2D9-42B9-355B-C8DCAEDE158B}"/>
+              </a:ext>
+            </a:extLst>
+          </p:cNvPr>
+          <p:cNvSpPr txBox="1">
+            <a:spLocks/>
+          </p:cNvSpPr>
+          <p:nvPr/>
+        </p:nvSpPr>
+        <p:spPr>
+          <a:xfrm>
+            <a:off x="76199" y="42862"/>
+            <a:ext cx="12039600" cy="701675"/>
+          </a:xfrm>
+          <a:prstGeom prst="rect">
+            <a:avLst/>
+          </a:prstGeom>
+          <a:solidFill>
+            <a:schemeClr val="tx2">
+              <a:lumMod val="10000"/>
+              <a:lumOff val="90000"/>
+            </a:schemeClr>
+          </a:solidFill>
+        </p:spPr>
+        <p:txBody>
+          <a:bodyPr vert="horz" lIns="91440" tIns="45720" rIns="91440" bIns="45720" rtlCol="0" anchor="ctr">
+            <a:normAutofit/>
+          </a:bodyPr>
+          <a:lstStyle>
+            <a:lvl1pPr algn="l" defTabSz="914400" rtl="0" eaLnBrk="1" latinLnBrk="0" hangingPunct="1">
+              <a:lnSpc>
+                <a:spcPct val="90000"/>
+              </a:lnSpc>
+              <a:spcBef>
+                <a:spcPct val="0"/>
+              </a:spcBef>
+              <a:buNone/>
+              <a:defRPr sz="4400" kern="1200">
+                <a:solidFill>
+                  <a:schemeClr val="tx1"/>
+                </a:solidFill>
+                <a:latin typeface="+mj-lt"/>
+                <a:ea typeface="+mj-ea"/>
+                <a:cs typeface="+mj-cs"/>
+              </a:defRPr>
+            </a:lvl1pPr>
+          </a:lstStyle>
+          <a:p>
+            <a:r>
+              <a:rPr lang="en-US" sz="4000" dirty="0">
+                <a:latin typeface="Arial" panose="020B0604020202020204" pitchFamily="34" charset="0"/>
+                <a:cs typeface="Arial" panose="020B0604020202020204" pitchFamily="34" charset="0"/>
+              </a:rPr>
+              <a:t>Why git?</a:t>
+            </a:r>
+          </a:p>
+        </p:txBody>
+      </p:sp>
+      <p:sp>
+        <p:nvSpPr>
+          <p:cNvPr id="13" name="Content Placeholder 2">
+            <a:extLst>
+              <a:ext uri="{FF2B5EF4-FFF2-40B4-BE49-F238E27FC236}">
+                <a16:creationId xmlns:a16="http://schemas.microsoft.com/office/drawing/2014/main" id="{1BFE9AD7-4024-C425-CA60-826527AD4A67}"/>
+              </a:ext>
+            </a:extLst>
+          </p:cNvPr>
+          <p:cNvSpPr>
+            <a:spLocks noGrp="1"/>
+          </p:cNvSpPr>
+          <p:nvPr>
+            <p:ph idx="1"/>
+          </p:nvPr>
+        </p:nvSpPr>
+        <p:spPr>
+          <a:xfrm>
+            <a:off x="76199" y="851581"/>
+            <a:ext cx="7679872" cy="5731300"/>
+          </a:xfrm>
+          <a:ln>
+            <a:noFill/>
+          </a:ln>
+        </p:spPr>
+        <p:txBody>
+          <a:bodyPr>
+            <a:normAutofit/>
+          </a:bodyPr>
+          <a:lstStyle/>
+          <a:p>
+            <a:r>
+              <a:rPr lang="en-US" sz="2400" b="1" dirty="0">
+                <a:latin typeface="Arial" panose="020B0604020202020204" pitchFamily="34" charset="0"/>
+                <a:cs typeface="Arial" panose="020B0604020202020204" pitchFamily="34" charset="0"/>
+              </a:rPr>
+              <a:t>Version control: </a:t>
+            </a:r>
+            <a:r>
+              <a:rPr lang="en-US" sz="2400" dirty="0">
+                <a:latin typeface="Arial" panose="020B0604020202020204" pitchFamily="34" charset="0"/>
+                <a:cs typeface="Arial" panose="020B0604020202020204" pitchFamily="34" charset="0"/>
+              </a:rPr>
+              <a:t>Saves prior code versions, can revert if needed</a:t>
+            </a:r>
+            <a:endParaRPr lang="en-US" sz="2400" b="1" dirty="0">
+              <a:latin typeface="Arial" panose="020B0604020202020204" pitchFamily="34" charset="0"/>
+              <a:cs typeface="Arial" panose="020B0604020202020204" pitchFamily="34" charset="0"/>
+            </a:endParaRPr>
+          </a:p>
+          <a:p>
+            <a:r>
+              <a:rPr lang="en-US" sz="2400" b="1" dirty="0">
+                <a:latin typeface="Arial" panose="020B0604020202020204" pitchFamily="34" charset="0"/>
+                <a:cs typeface="Arial" panose="020B0604020202020204" pitchFamily="34" charset="0"/>
+              </a:rPr>
+              <a:t>Collaboration</a:t>
+            </a:r>
+            <a:r>
+              <a:rPr lang="en-US" sz="2400" dirty="0">
+                <a:latin typeface="Arial" panose="020B0604020202020204" pitchFamily="34" charset="0"/>
+                <a:cs typeface="Arial" panose="020B0604020202020204" pitchFamily="34" charset="0"/>
+              </a:rPr>
+              <a:t>:</a:t>
+            </a:r>
+            <a:r>
+              <a:rPr lang="en-US" sz="2400" b="1" dirty="0">
+                <a:latin typeface="Arial" panose="020B0604020202020204" pitchFamily="34" charset="0"/>
+                <a:cs typeface="Arial" panose="020B0604020202020204" pitchFamily="34" charset="0"/>
+              </a:rPr>
+              <a:t> </a:t>
+            </a:r>
+            <a:r>
+              <a:rPr lang="en-US" sz="2400" dirty="0">
+                <a:latin typeface="Arial" panose="020B0604020202020204" pitchFamily="34" charset="0"/>
+                <a:cs typeface="Arial" panose="020B0604020202020204" pitchFamily="34" charset="0"/>
+              </a:rPr>
+              <a:t>Team members can edit same codebase in parallel </a:t>
+            </a:r>
+          </a:p>
+          <a:p>
+            <a:r>
+              <a:rPr lang="en-US" sz="2400" b="1" dirty="0">
+                <a:latin typeface="Arial" panose="020B0604020202020204" pitchFamily="34" charset="0"/>
+                <a:cs typeface="Arial" panose="020B0604020202020204" pitchFamily="34" charset="0"/>
+              </a:rPr>
+              <a:t>Accountability</a:t>
+            </a:r>
+            <a:r>
+              <a:rPr lang="en-US" sz="2400" dirty="0">
+                <a:latin typeface="Arial" panose="020B0604020202020204" pitchFamily="34" charset="0"/>
+                <a:cs typeface="Arial" panose="020B0604020202020204" pitchFamily="34" charset="0"/>
+              </a:rPr>
+              <a:t>: Write code that others can read, run, and edit!</a:t>
+            </a:r>
+          </a:p>
+        </p:txBody>
+      </p:sp>
+      <p:pic>
+        <p:nvPicPr>
+          <p:cNvPr id="1026" name="Picture 2" descr="Git">
+            <a:extLst>
+              <a:ext uri="{FF2B5EF4-FFF2-40B4-BE49-F238E27FC236}">
+                <a16:creationId xmlns:a16="http://schemas.microsoft.com/office/drawing/2014/main" id="{67000203-BF7E-80C1-93C7-FF92AC070DD1}"/>
+              </a:ext>
+            </a:extLst>
+          </p:cNvPr>
+          <p:cNvPicPr>
+            <a:picLocks noChangeAspect="1" noChangeArrowheads="1"/>
+          </p:cNvPicPr>
+          <p:nvPr/>
+        </p:nvPicPr>
+        <p:blipFill>
+          <a:blip r:embed="rId2">
+            <a:extLst>
+              <a:ext uri="{28A0092B-C50C-407E-A947-70E740481C1C}">
+                <a14:useLocalDpi xmlns:a14="http://schemas.microsoft.com/office/drawing/2010/main" val="0"/>
+              </a:ext>
+            </a:extLst>
+          </a:blip>
+          <a:srcRect/>
+          <a:stretch>
+            <a:fillRect/>
+          </a:stretch>
+        </p:blipFill>
+        <p:spPr bwMode="auto">
+          <a:xfrm>
+            <a:off x="7756071" y="787400"/>
+            <a:ext cx="4191000" cy="6070600"/>
+          </a:xfrm>
+          <a:prstGeom prst="rect">
+            <a:avLst/>
+          </a:prstGeom>
+          <a:noFill/>
+          <a:extLst>
+            <a:ext uri="{909E8E84-426E-40DD-AFC4-6F175D3DCCD1}">
+              <a14:hiddenFill xmlns:a14="http://schemas.microsoft.com/office/drawing/2010/main">
+                <a:solidFill>
+                  <a:srgbClr val="FFFFFF"/>
+                </a:solidFill>
+              </a14:hiddenFill>
+            </a:ext>
+          </a:extLst>
+        </p:spPr>
+      </p:pic>
+    </p:spTree>
+    <p:extLst>
+      <p:ext uri="{BB962C8B-B14F-4D97-AF65-F5344CB8AC3E}">
+        <p14:creationId xmlns:p14="http://schemas.microsoft.com/office/powerpoint/2010/main" val="1226516820"/>
+      </p:ext>
+    </p:extLst>
+  </p:cSld>
+  <p:clrMapOvr>
+    <a:masterClrMapping/>
+  </p:clrMapOvr>
+</p:sld>
+</file>
+
+<file path=ppt/slides/slide3.xml><?xml version="1.0" encoding="utf-8"?>
+<p:sld xmlns:a="http://schemas.openxmlformats.org/drawingml/2006/main" xmlns:r="http://schemas.openxmlformats.org/officeDocument/2006/relationships" xmlns:p="http://schemas.openxmlformats.org/presentationml/2006/main">
+  <p:cSld>
+    <p:spTree>
+      <p:nvGrpSpPr>
+        <p:cNvPr id="1" name="">
+          <a:extLst>
+            <a:ext uri="{FF2B5EF4-FFF2-40B4-BE49-F238E27FC236}">
               <a16:creationId xmlns:a16="http://schemas.microsoft.com/office/drawing/2014/main" id="{7C40243C-87DD-E03A-DC7B-260351DE30C3}"/>
             </a:ext>
           </a:extLst>
@@ -4028,7 +4315,7 @@
         <p:spPr>
           <a:xfrm>
             <a:off x="76199" y="851581"/>
-            <a:ext cx="12039600" cy="5731300"/>
+            <a:ext cx="7679872" cy="5731300"/>
           </a:xfrm>
           <a:ln>
             <a:noFill/>
@@ -4036,61 +4323,157 @@
         </p:spPr>
         <p:txBody>
           <a:bodyPr>
-            <a:normAutofit/>
+            <a:noAutofit/>
           </a:bodyPr>
           <a:lstStyle/>
           <a:p>
             <a:r>
+              <a:rPr lang="en-US" sz="2400" b="1" dirty="0">
+                <a:latin typeface="Arial" panose="020B0604020202020204" pitchFamily="34" charset="0"/>
+                <a:cs typeface="Arial" panose="020B0604020202020204" pitchFamily="34" charset="0"/>
+              </a:rPr>
+              <a:t>Version control: </a:t>
+            </a:r>
+            <a:r>
               <a:rPr lang="en-US" sz="2400" dirty="0">
                 <a:latin typeface="Arial" panose="020B0604020202020204" pitchFamily="34" charset="0"/>
                 <a:cs typeface="Arial" panose="020B0604020202020204" pitchFamily="34" charset="0"/>
               </a:rPr>
-              <a:t>Version control</a:t>
-            </a:r>
-          </a:p>
-          <a:p>
+              <a:t>Saves prior code versions, can revert if needed</a:t>
+            </a:r>
+            <a:endParaRPr lang="en-US" sz="2400" b="1" dirty="0">
+              <a:latin typeface="Arial" panose="020B0604020202020204" pitchFamily="34" charset="0"/>
+              <a:cs typeface="Arial" panose="020B0604020202020204" pitchFamily="34" charset="0"/>
+            </a:endParaRPr>
+          </a:p>
+          <a:p>
+            <a:r>
+              <a:rPr lang="en-US" sz="2400" b="1" dirty="0">
+                <a:latin typeface="Arial" panose="020B0604020202020204" pitchFamily="34" charset="0"/>
+                <a:cs typeface="Arial" panose="020B0604020202020204" pitchFamily="34" charset="0"/>
+              </a:rPr>
+              <a:t>Collaboration</a:t>
+            </a:r>
             <a:r>
               <a:rPr lang="en-US" sz="2400" dirty="0">
                 <a:latin typeface="Arial" panose="020B0604020202020204" pitchFamily="34" charset="0"/>
                 <a:cs typeface="Arial" panose="020B0604020202020204" pitchFamily="34" charset="0"/>
               </a:rPr>
-              <a:t>Collaboration</a:t>
-            </a:r>
-          </a:p>
-          <a:p>
+              <a:t>:</a:t>
+            </a:r>
+            <a:r>
+              <a:rPr lang="en-US" sz="2400" b="1" dirty="0">
+                <a:latin typeface="Arial" panose="020B0604020202020204" pitchFamily="34" charset="0"/>
+                <a:cs typeface="Arial" panose="020B0604020202020204" pitchFamily="34" charset="0"/>
+              </a:rPr>
+              <a:t> </a:t>
+            </a:r>
             <a:r>
               <a:rPr lang="en-US" sz="2400" dirty="0">
                 <a:latin typeface="Arial" panose="020B0604020202020204" pitchFamily="34" charset="0"/>
                 <a:cs typeface="Arial" panose="020B0604020202020204" pitchFamily="34" charset="0"/>
               </a:rPr>
+              <a:t>Team members can edit same codebase in parallel </a:t>
+            </a:r>
+          </a:p>
+          <a:p>
+            <a:r>
+              <a:rPr lang="en-US" sz="2400" b="1" dirty="0">
+                <a:latin typeface="Arial" panose="020B0604020202020204" pitchFamily="34" charset="0"/>
+                <a:cs typeface="Arial" panose="020B0604020202020204" pitchFamily="34" charset="0"/>
+              </a:rPr>
               <a:t>Accountability</a:t>
             </a:r>
-          </a:p>
-          <a:p>
+            <a:r>
+              <a:rPr lang="en-US" sz="2400" dirty="0">
+                <a:latin typeface="Arial" panose="020B0604020202020204" pitchFamily="34" charset="0"/>
+                <a:cs typeface="Arial" panose="020B0604020202020204" pitchFamily="34" charset="0"/>
+              </a:rPr>
+              <a:t>: Write code that others can read, run, and edit!</a:t>
+            </a:r>
+          </a:p>
+          <a:p>
+            <a:pPr marL="0" indent="0">
+              <a:buNone/>
+            </a:pPr>
             <a:endParaRPr lang="en-US" sz="2400" dirty="0">
               <a:latin typeface="Arial" panose="020B0604020202020204" pitchFamily="34" charset="0"/>
               <a:cs typeface="Arial" panose="020B0604020202020204" pitchFamily="34" charset="0"/>
             </a:endParaRPr>
           </a:p>
           <a:p>
-            <a:endParaRPr lang="en-US" sz="2400" dirty="0">
+            <a:r>
+              <a:rPr lang="en-US" sz="2400" b="1" i="1" dirty="0">
+                <a:latin typeface="Arial" panose="020B0604020202020204" pitchFamily="34" charset="0"/>
+                <a:cs typeface="Arial" panose="020B0604020202020204" pitchFamily="34" charset="0"/>
+              </a:rPr>
+              <a:t>*Git vs. GitHub</a:t>
+            </a:r>
+            <a:endParaRPr lang="en-US" sz="2000" b="1" i="1" dirty="0">
               <a:latin typeface="Arial" panose="020B0604020202020204" pitchFamily="34" charset="0"/>
               <a:cs typeface="Arial" panose="020B0604020202020204" pitchFamily="34" charset="0"/>
             </a:endParaRPr>
           </a:p>
           <a:p>
-            <a:endParaRPr lang="en-US" sz="2400" dirty="0">
-              <a:latin typeface="Arial" panose="020B0604020202020204" pitchFamily="34" charset="0"/>
-              <a:cs typeface="Arial" panose="020B0604020202020204" pitchFamily="34" charset="0"/>
-            </a:endParaRPr>
-          </a:p>
-          <a:p>
-            <a:r>
-              <a:rPr lang="en-US" sz="2400" dirty="0">
-                <a:latin typeface="Arial" panose="020B0604020202020204" pitchFamily="34" charset="0"/>
-                <a:cs typeface="Arial" panose="020B0604020202020204" pitchFamily="34" charset="0"/>
-              </a:rPr>
-              <a:t>git vs. GitHub</a:t>
+            <a:pPr lvl="1"/>
+            <a:r>
+              <a:rPr lang="en-US" sz="2000" b="1" dirty="0">
+                <a:latin typeface="Arial" panose="020B0604020202020204" pitchFamily="34" charset="0"/>
+                <a:cs typeface="Arial" panose="020B0604020202020204" pitchFamily="34" charset="0"/>
+              </a:rPr>
+              <a:t>Git</a:t>
+            </a:r>
+            <a:r>
+              <a:rPr lang="en-US" sz="2000" dirty="0">
+                <a:latin typeface="Arial" panose="020B0604020202020204" pitchFamily="34" charset="0"/>
+                <a:cs typeface="Arial" panose="020B0604020202020204" pitchFamily="34" charset="0"/>
+              </a:rPr>
+              <a:t>: local </a:t>
+            </a:r>
+            <a:r>
+              <a:rPr lang="en-US" sz="2000" u="sng" dirty="0">
+                <a:latin typeface="Arial" panose="020B0604020202020204" pitchFamily="34" charset="0"/>
+                <a:cs typeface="Arial" panose="020B0604020202020204" pitchFamily="34" charset="0"/>
+              </a:rPr>
+              <a:t>software</a:t>
+            </a:r>
+            <a:r>
+              <a:rPr lang="en-US" sz="2000" dirty="0">
+                <a:latin typeface="Arial" panose="020B0604020202020204" pitchFamily="34" charset="0"/>
+                <a:cs typeface="Arial" panose="020B0604020202020204" pitchFamily="34" charset="0"/>
+              </a:rPr>
+              <a:t> for managing repositories</a:t>
+            </a:r>
+          </a:p>
+          <a:p>
+            <a:pPr lvl="1"/>
+            <a:r>
+              <a:rPr lang="en-US" sz="2000" b="1" dirty="0">
+                <a:latin typeface="Arial" panose="020B0604020202020204" pitchFamily="34" charset="0"/>
+                <a:cs typeface="Arial" panose="020B0604020202020204" pitchFamily="34" charset="0"/>
+              </a:rPr>
+              <a:t>GitHub</a:t>
+            </a:r>
+            <a:r>
+              <a:rPr lang="en-US" sz="2000" dirty="0">
+                <a:latin typeface="Arial" panose="020B0604020202020204" pitchFamily="34" charset="0"/>
+                <a:cs typeface="Arial" panose="020B0604020202020204" pitchFamily="34" charset="0"/>
+              </a:rPr>
+              <a:t>: </a:t>
+            </a:r>
+            <a:r>
+              <a:rPr lang="en-US" sz="2000" u="sng" dirty="0">
+                <a:latin typeface="Arial" panose="020B0604020202020204" pitchFamily="34" charset="0"/>
+                <a:cs typeface="Arial" panose="020B0604020202020204" pitchFamily="34" charset="0"/>
+              </a:rPr>
+              <a:t>Web service </a:t>
+            </a:r>
+            <a:r>
+              <a:rPr lang="en-US" sz="2000" dirty="0">
+                <a:latin typeface="Arial" panose="020B0604020202020204" pitchFamily="34" charset="0"/>
+                <a:cs typeface="Arial" panose="020B0604020202020204" pitchFamily="34" charset="0"/>
+              </a:rPr>
+              <a:t>with graphical interface for hosting repositories</a:t>
             </a:r>
           </a:p>
         </p:txBody>
@@ -4155,7 +4538,405 @@
 </p:sld>
 </file>
 
-<file path=ppt/slides/slide3.xml><?xml version="1.0" encoding="utf-8"?>
+<file path=ppt/slides/slide4.xml><?xml version="1.0" encoding="utf-8"?>
+<p:sld xmlns:a="http://schemas.openxmlformats.org/drawingml/2006/main" xmlns:r="http://schemas.openxmlformats.org/officeDocument/2006/relationships" xmlns:p="http://schemas.openxmlformats.org/presentationml/2006/main">
+  <p:cSld>
+    <p:spTree>
+      <p:nvGrpSpPr>
+        <p:cNvPr id="1" name="">
+          <a:extLst>
+            <a:ext uri="{FF2B5EF4-FFF2-40B4-BE49-F238E27FC236}">
+              <a16:creationId xmlns:a16="http://schemas.microsoft.com/office/drawing/2014/main" id="{89407349-6F48-9C2D-3A5F-7536268A6D76}"/>
+            </a:ext>
+          </a:extLst>
+        </p:cNvPr>
+        <p:cNvGrpSpPr/>
+        <p:nvPr/>
+      </p:nvGrpSpPr>
+      <p:grpSpPr>
+        <a:xfrm>
+          <a:off x="0" y="0"/>
+          <a:ext cx="0" cy="0"/>
+          <a:chOff x="0" y="0"/>
+          <a:chExt cx="0" cy="0"/>
+        </a:xfrm>
+      </p:grpSpPr>
+      <p:sp>
+        <p:nvSpPr>
+          <p:cNvPr id="5" name="Slide Number Placeholder 4">
+            <a:extLst>
+              <a:ext uri="{FF2B5EF4-FFF2-40B4-BE49-F238E27FC236}">
+                <a16:creationId xmlns:a16="http://schemas.microsoft.com/office/drawing/2014/main" id="{95576E31-8D94-887E-2858-3445838A52D8}"/>
+              </a:ext>
+            </a:extLst>
+          </p:cNvPr>
+          <p:cNvSpPr>
+            <a:spLocks noGrp="1"/>
+          </p:cNvSpPr>
+          <p:nvPr>
+            <p:ph type="sldNum" sz="quarter" idx="12"/>
+          </p:nvPr>
+        </p:nvSpPr>
+        <p:spPr>
+          <a:xfrm>
+            <a:off x="11702143" y="6554206"/>
+            <a:ext cx="489857" cy="365125"/>
+          </a:xfrm>
+        </p:spPr>
+        <p:txBody>
+          <a:bodyPr/>
+          <a:lstStyle/>
+          <a:p>
+            <a:r>
+              <a:rPr lang="en-US" dirty="0">
+                <a:latin typeface="Arial" panose="020B0604020202020204" pitchFamily="34" charset="0"/>
+                <a:cs typeface="Arial" panose="020B0604020202020204" pitchFamily="34" charset="0"/>
+              </a:rPr>
+              <a:t>1</a:t>
+            </a:r>
+          </a:p>
+        </p:txBody>
+      </p:sp>
+      <p:sp>
+        <p:nvSpPr>
+          <p:cNvPr id="8" name="Title 1">
+            <a:extLst>
+              <a:ext uri="{FF2B5EF4-FFF2-40B4-BE49-F238E27FC236}">
+                <a16:creationId xmlns:a16="http://schemas.microsoft.com/office/drawing/2014/main" id="{7F920C15-C90D-0D3D-ED6F-E4B6CEF1C7B2}"/>
+              </a:ext>
+            </a:extLst>
+          </p:cNvPr>
+          <p:cNvSpPr txBox="1">
+            <a:spLocks/>
+          </p:cNvSpPr>
+          <p:nvPr/>
+        </p:nvSpPr>
+        <p:spPr>
+          <a:xfrm>
+            <a:off x="76199" y="42862"/>
+            <a:ext cx="12039600" cy="701675"/>
+          </a:xfrm>
+          <a:prstGeom prst="rect">
+            <a:avLst/>
+          </a:prstGeom>
+          <a:solidFill>
+            <a:schemeClr val="tx2">
+              <a:lumMod val="10000"/>
+              <a:lumOff val="90000"/>
+            </a:schemeClr>
+          </a:solidFill>
+        </p:spPr>
+        <p:txBody>
+          <a:bodyPr vert="horz" lIns="91440" tIns="45720" rIns="91440" bIns="45720" rtlCol="0" anchor="ctr">
+            <a:normAutofit/>
+          </a:bodyPr>
+          <a:lstStyle>
+            <a:lvl1pPr algn="l" defTabSz="914400" rtl="0" eaLnBrk="1" latinLnBrk="0" hangingPunct="1">
+              <a:lnSpc>
+                <a:spcPct val="90000"/>
+              </a:lnSpc>
+              <a:spcBef>
+                <a:spcPct val="0"/>
+              </a:spcBef>
+              <a:buNone/>
+              <a:defRPr sz="4400" kern="1200">
+                <a:solidFill>
+                  <a:schemeClr val="tx1"/>
+                </a:solidFill>
+                <a:latin typeface="+mj-lt"/>
+                <a:ea typeface="+mj-ea"/>
+                <a:cs typeface="+mj-cs"/>
+              </a:defRPr>
+            </a:lvl1pPr>
+          </a:lstStyle>
+          <a:p>
+            <a:r>
+              <a:rPr lang="en-US" sz="4000" dirty="0">
+                <a:latin typeface="Arial" panose="020B0604020202020204" pitchFamily="34" charset="0"/>
+                <a:cs typeface="Arial" panose="020B0604020202020204" pitchFamily="34" charset="0"/>
+              </a:rPr>
+              <a:t>Why git?</a:t>
+            </a:r>
+          </a:p>
+        </p:txBody>
+      </p:sp>
+      <p:sp>
+        <p:nvSpPr>
+          <p:cNvPr id="13" name="Content Placeholder 2">
+            <a:extLst>
+              <a:ext uri="{FF2B5EF4-FFF2-40B4-BE49-F238E27FC236}">
+                <a16:creationId xmlns:a16="http://schemas.microsoft.com/office/drawing/2014/main" id="{79F6D63C-33B8-2F49-5198-FD6EBE22DF6B}"/>
+              </a:ext>
+            </a:extLst>
+          </p:cNvPr>
+          <p:cNvSpPr>
+            <a:spLocks noGrp="1"/>
+          </p:cNvSpPr>
+          <p:nvPr>
+            <p:ph idx="1"/>
+          </p:nvPr>
+        </p:nvSpPr>
+        <p:spPr>
+          <a:xfrm>
+            <a:off x="76199" y="851581"/>
+            <a:ext cx="7679872" cy="5731300"/>
+          </a:xfrm>
+          <a:ln>
+            <a:noFill/>
+          </a:ln>
+        </p:spPr>
+        <p:txBody>
+          <a:bodyPr>
+            <a:noAutofit/>
+          </a:bodyPr>
+          <a:lstStyle/>
+          <a:p>
+            <a:r>
+              <a:rPr lang="en-US" sz="2400" b="1" dirty="0">
+                <a:latin typeface="Arial" panose="020B0604020202020204" pitchFamily="34" charset="0"/>
+                <a:cs typeface="Arial" panose="020B0604020202020204" pitchFamily="34" charset="0"/>
+              </a:rPr>
+              <a:t>Version control: </a:t>
+            </a:r>
+            <a:r>
+              <a:rPr lang="en-US" sz="2400" dirty="0">
+                <a:latin typeface="Arial" panose="020B0604020202020204" pitchFamily="34" charset="0"/>
+                <a:cs typeface="Arial" panose="020B0604020202020204" pitchFamily="34" charset="0"/>
+              </a:rPr>
+              <a:t>Saves prior code versions, can revert if needed</a:t>
+            </a:r>
+            <a:endParaRPr lang="en-US" sz="2400" b="1" dirty="0">
+              <a:latin typeface="Arial" panose="020B0604020202020204" pitchFamily="34" charset="0"/>
+              <a:cs typeface="Arial" panose="020B0604020202020204" pitchFamily="34" charset="0"/>
+            </a:endParaRPr>
+          </a:p>
+          <a:p>
+            <a:r>
+              <a:rPr lang="en-US" sz="2400" b="1" dirty="0">
+                <a:latin typeface="Arial" panose="020B0604020202020204" pitchFamily="34" charset="0"/>
+                <a:cs typeface="Arial" panose="020B0604020202020204" pitchFamily="34" charset="0"/>
+              </a:rPr>
+              <a:t>Collaboration</a:t>
+            </a:r>
+            <a:r>
+              <a:rPr lang="en-US" sz="2400" dirty="0">
+                <a:latin typeface="Arial" panose="020B0604020202020204" pitchFamily="34" charset="0"/>
+                <a:cs typeface="Arial" panose="020B0604020202020204" pitchFamily="34" charset="0"/>
+              </a:rPr>
+              <a:t>:</a:t>
+            </a:r>
+            <a:r>
+              <a:rPr lang="en-US" sz="2400" b="1" dirty="0">
+                <a:latin typeface="Arial" panose="020B0604020202020204" pitchFamily="34" charset="0"/>
+                <a:cs typeface="Arial" panose="020B0604020202020204" pitchFamily="34" charset="0"/>
+              </a:rPr>
+              <a:t> </a:t>
+            </a:r>
+            <a:r>
+              <a:rPr lang="en-US" sz="2400" dirty="0">
+                <a:latin typeface="Arial" panose="020B0604020202020204" pitchFamily="34" charset="0"/>
+                <a:cs typeface="Arial" panose="020B0604020202020204" pitchFamily="34" charset="0"/>
+              </a:rPr>
+              <a:t>Team members can edit same codebase in parallel </a:t>
+            </a:r>
+          </a:p>
+          <a:p>
+            <a:r>
+              <a:rPr lang="en-US" sz="2400" b="1" dirty="0">
+                <a:latin typeface="Arial" panose="020B0604020202020204" pitchFamily="34" charset="0"/>
+                <a:cs typeface="Arial" panose="020B0604020202020204" pitchFamily="34" charset="0"/>
+              </a:rPr>
+              <a:t>Accountability</a:t>
+            </a:r>
+            <a:r>
+              <a:rPr lang="en-US" sz="2400" dirty="0">
+                <a:latin typeface="Arial" panose="020B0604020202020204" pitchFamily="34" charset="0"/>
+                <a:cs typeface="Arial" panose="020B0604020202020204" pitchFamily="34" charset="0"/>
+              </a:rPr>
+              <a:t>: Write code that others can read, run, and edit!</a:t>
+            </a:r>
+          </a:p>
+          <a:p>
+            <a:pPr marL="0" indent="0">
+              <a:buNone/>
+            </a:pPr>
+            <a:endParaRPr lang="en-US" sz="2400" dirty="0">
+              <a:latin typeface="Arial" panose="020B0604020202020204" pitchFamily="34" charset="0"/>
+              <a:cs typeface="Arial" panose="020B0604020202020204" pitchFamily="34" charset="0"/>
+            </a:endParaRPr>
+          </a:p>
+          <a:p>
+            <a:r>
+              <a:rPr lang="en-US" sz="2400" b="1" i="1" dirty="0">
+                <a:latin typeface="Arial" panose="020B0604020202020204" pitchFamily="34" charset="0"/>
+                <a:cs typeface="Arial" panose="020B0604020202020204" pitchFamily="34" charset="0"/>
+              </a:rPr>
+              <a:t>*Git vs. GitHub</a:t>
+            </a:r>
+            <a:endParaRPr lang="en-US" sz="2000" b="1" i="1" dirty="0">
+              <a:latin typeface="Arial" panose="020B0604020202020204" pitchFamily="34" charset="0"/>
+              <a:cs typeface="Arial" panose="020B0604020202020204" pitchFamily="34" charset="0"/>
+            </a:endParaRPr>
+          </a:p>
+          <a:p>
+            <a:pPr lvl="1"/>
+            <a:r>
+              <a:rPr lang="en-US" sz="2000" b="1" dirty="0">
+                <a:latin typeface="Arial" panose="020B0604020202020204" pitchFamily="34" charset="0"/>
+                <a:cs typeface="Arial" panose="020B0604020202020204" pitchFamily="34" charset="0"/>
+              </a:rPr>
+              <a:t>Git</a:t>
+            </a:r>
+            <a:r>
+              <a:rPr lang="en-US" sz="2000" dirty="0">
+                <a:latin typeface="Arial" panose="020B0604020202020204" pitchFamily="34" charset="0"/>
+                <a:cs typeface="Arial" panose="020B0604020202020204" pitchFamily="34" charset="0"/>
+              </a:rPr>
+              <a:t>: local </a:t>
+            </a:r>
+            <a:r>
+              <a:rPr lang="en-US" sz="2000" u="sng" dirty="0">
+                <a:latin typeface="Arial" panose="020B0604020202020204" pitchFamily="34" charset="0"/>
+                <a:cs typeface="Arial" panose="020B0604020202020204" pitchFamily="34" charset="0"/>
+              </a:rPr>
+              <a:t>software</a:t>
+            </a:r>
+            <a:r>
+              <a:rPr lang="en-US" sz="2000" dirty="0">
+                <a:latin typeface="Arial" panose="020B0604020202020204" pitchFamily="34" charset="0"/>
+                <a:cs typeface="Arial" panose="020B0604020202020204" pitchFamily="34" charset="0"/>
+              </a:rPr>
+              <a:t> for managing repositories</a:t>
+            </a:r>
+          </a:p>
+          <a:p>
+            <a:pPr lvl="1"/>
+            <a:r>
+              <a:rPr lang="en-US" sz="2000" b="1" dirty="0">
+                <a:latin typeface="Arial" panose="020B0604020202020204" pitchFamily="34" charset="0"/>
+                <a:cs typeface="Arial" panose="020B0604020202020204" pitchFamily="34" charset="0"/>
+              </a:rPr>
+              <a:t>GitHub</a:t>
+            </a:r>
+            <a:r>
+              <a:rPr lang="en-US" sz="2000" dirty="0">
+                <a:latin typeface="Arial" panose="020B0604020202020204" pitchFamily="34" charset="0"/>
+                <a:cs typeface="Arial" panose="020B0604020202020204" pitchFamily="34" charset="0"/>
+              </a:rPr>
+              <a:t>: </a:t>
+            </a:r>
+            <a:r>
+              <a:rPr lang="en-US" sz="2000" u="sng" dirty="0">
+                <a:latin typeface="Arial" panose="020B0604020202020204" pitchFamily="34" charset="0"/>
+                <a:cs typeface="Arial" panose="020B0604020202020204" pitchFamily="34" charset="0"/>
+              </a:rPr>
+              <a:t>Web service </a:t>
+            </a:r>
+            <a:r>
+              <a:rPr lang="en-US" sz="2000" dirty="0">
+                <a:latin typeface="Arial" panose="020B0604020202020204" pitchFamily="34" charset="0"/>
+                <a:cs typeface="Arial" panose="020B0604020202020204" pitchFamily="34" charset="0"/>
+              </a:rPr>
+              <a:t>with graphical interface for hosting repositories</a:t>
+            </a:r>
+          </a:p>
+          <a:p>
+            <a:pPr lvl="1"/>
+            <a:endParaRPr lang="en-US" sz="2000" dirty="0">
+              <a:latin typeface="Arial" panose="020B0604020202020204" pitchFamily="34" charset="0"/>
+              <a:cs typeface="Arial" panose="020B0604020202020204" pitchFamily="34" charset="0"/>
+            </a:endParaRPr>
+          </a:p>
+          <a:p>
+            <a:pPr lvl="1"/>
+            <a:endParaRPr lang="en-US" sz="2000" dirty="0">
+              <a:latin typeface="Arial" panose="020B0604020202020204" pitchFamily="34" charset="0"/>
+              <a:cs typeface="Arial" panose="020B0604020202020204" pitchFamily="34" charset="0"/>
+            </a:endParaRPr>
+          </a:p>
+          <a:p>
+            <a:r>
+              <a:rPr lang="en-US" sz="2400" b="1" dirty="0">
+                <a:latin typeface="Arial" panose="020B0604020202020204" pitchFamily="34" charset="0"/>
+                <a:cs typeface="Arial" panose="020B0604020202020204" pitchFamily="34" charset="0"/>
+              </a:rPr>
+              <a:t>Future Career: </a:t>
+            </a:r>
+            <a:r>
+              <a:rPr lang="en-US" sz="2400" dirty="0">
+                <a:latin typeface="Arial" panose="020B0604020202020204" pitchFamily="34" charset="0"/>
+                <a:cs typeface="Arial" panose="020B0604020202020204" pitchFamily="34" charset="0"/>
+              </a:rPr>
+              <a:t>Many industry jobs request links to GitHub profiles!</a:t>
+            </a:r>
+            <a:endParaRPr lang="en-US" sz="2400" b="1" dirty="0">
+              <a:latin typeface="Arial" panose="020B0604020202020204" pitchFamily="34" charset="0"/>
+              <a:cs typeface="Arial" panose="020B0604020202020204" pitchFamily="34" charset="0"/>
+            </a:endParaRPr>
+          </a:p>
+        </p:txBody>
+      </p:sp>
+      <p:pic>
+        <p:nvPicPr>
+          <p:cNvPr id="1026" name="Picture 2" descr="Git">
+            <a:extLst>
+              <a:ext uri="{FF2B5EF4-FFF2-40B4-BE49-F238E27FC236}">
+                <a16:creationId xmlns:a16="http://schemas.microsoft.com/office/drawing/2014/main" id="{1F959375-5559-CA66-BFFD-D44C1F63E66B}"/>
+              </a:ext>
+            </a:extLst>
+          </p:cNvPr>
+          <p:cNvPicPr>
+            <a:picLocks noChangeAspect="1" noChangeArrowheads="1"/>
+          </p:cNvPicPr>
+          <p:nvPr/>
+        </p:nvPicPr>
+        <p:blipFill>
+          <a:blip r:embed="rId2">
+            <a:extLst>
+              <a:ext uri="{28A0092B-C50C-407E-A947-70E740481C1C}">
+                <a14:useLocalDpi xmlns:a14="http://schemas.microsoft.com/office/drawing/2010/main" val="0"/>
+              </a:ext>
+            </a:extLst>
+          </a:blip>
+          <a:srcRect/>
+          <a:stretch>
+            <a:fillRect/>
+          </a:stretch>
+        </p:blipFill>
+        <p:spPr bwMode="auto">
+          <a:xfrm>
+            <a:off x="7756071" y="787400"/>
+            <a:ext cx="4191000" cy="6070600"/>
+          </a:xfrm>
+          <a:prstGeom prst="rect">
+            <a:avLst/>
+          </a:prstGeom>
+          <a:noFill/>
+          <a:extLst>
+            <a:ext uri="{909E8E84-426E-40DD-AFC4-6F175D3DCCD1}">
+              <a14:hiddenFill xmlns:a14="http://schemas.microsoft.com/office/drawing/2010/main">
+                <a:solidFill>
+                  <a:srgbClr val="FFFFFF"/>
+                </a:solidFill>
+              </a14:hiddenFill>
+            </a:ext>
+          </a:extLst>
+        </p:spPr>
+      </p:pic>
+    </p:spTree>
+    <p:extLst>
+      <p:ext uri="{BB962C8B-B14F-4D97-AF65-F5344CB8AC3E}">
+        <p14:creationId xmlns:p14="http://schemas.microsoft.com/office/powerpoint/2010/main" val="710763362"/>
+      </p:ext>
+    </p:extLst>
+  </p:cSld>
+  <p:clrMapOvr>
+    <a:masterClrMapping/>
+  </p:clrMapOvr>
+</p:sld>
+</file>
+
+<file path=ppt/slides/slide5.xml><?xml version="1.0" encoding="utf-8"?>
 <p:sld xmlns:a="http://schemas.openxmlformats.org/drawingml/2006/main" xmlns:r="http://schemas.openxmlformats.org/officeDocument/2006/relationships" xmlns:p="http://schemas.openxmlformats.org/presentationml/2006/main">
   <p:cSld>
     <p:spTree>
@@ -4309,38 +5090,95 @@
           <a:lstStyle/>
           <a:p>
             <a:r>
+              <a:rPr lang="en-US" sz="2400" b="1" dirty="0">
+                <a:latin typeface="Arial" panose="020B0604020202020204" pitchFamily="34" charset="0"/>
+                <a:cs typeface="Arial" panose="020B0604020202020204" pitchFamily="34" charset="0"/>
+              </a:rPr>
+              <a:t>Repositories: </a:t>
+            </a:r>
+            <a:r>
               <a:rPr lang="en-US" sz="2400" dirty="0">
                 <a:latin typeface="Arial" panose="020B0604020202020204" pitchFamily="34" charset="0"/>
                 <a:cs typeface="Arial" panose="020B0604020202020204" pitchFamily="34" charset="0"/>
               </a:rPr>
-              <a:t>Repositories</a:t>
-            </a:r>
+              <a:t>Where the codebase is stored</a:t>
+            </a:r>
+            <a:endParaRPr lang="en-US" sz="2400" b="1" dirty="0">
+              <a:latin typeface="Arial" panose="020B0604020202020204" pitchFamily="34" charset="0"/>
+              <a:cs typeface="Arial" panose="020B0604020202020204" pitchFamily="34" charset="0"/>
+            </a:endParaRPr>
           </a:p>
           <a:p>
             <a:pPr lvl="1"/>
             <a:r>
+              <a:rPr lang="en-US" sz="2000" b="1" dirty="0">
+                <a:latin typeface="Arial" panose="020B0604020202020204" pitchFamily="34" charset="0"/>
+                <a:cs typeface="Arial" panose="020B0604020202020204" pitchFamily="34" charset="0"/>
+              </a:rPr>
+              <a:t>README</a:t>
+            </a:r>
+            <a:r>
               <a:rPr lang="en-US" sz="2000" dirty="0">
                 <a:latin typeface="Arial" panose="020B0604020202020204" pitchFamily="34" charset="0"/>
                 <a:cs typeface="Arial" panose="020B0604020202020204" pitchFamily="34" charset="0"/>
               </a:rPr>
-              <a:t>README</a:t>
+              <a:t>: Directions to run code</a:t>
             </a:r>
           </a:p>
           <a:p>
             <a:pPr lvl="1"/>
             <a:r>
+              <a:rPr lang="en-US" sz="2000" b="1" dirty="0">
+                <a:latin typeface="Arial" panose="020B0604020202020204" pitchFamily="34" charset="0"/>
+                <a:cs typeface="Arial" panose="020B0604020202020204" pitchFamily="34" charset="0"/>
+              </a:rPr>
+              <a:t>.</a:t>
+            </a:r>
+            <a:r>
+              <a:rPr lang="en-US" sz="2000" b="1" dirty="0" err="1">
+                <a:latin typeface="Arial" panose="020B0604020202020204" pitchFamily="34" charset="0"/>
+                <a:cs typeface="Arial" panose="020B0604020202020204" pitchFamily="34" charset="0"/>
+              </a:rPr>
+              <a:t>gitignore</a:t>
+            </a:r>
+            <a:r>
               <a:rPr lang="en-US" sz="2000" dirty="0">
                 <a:latin typeface="Arial" panose="020B0604020202020204" pitchFamily="34" charset="0"/>
                 <a:cs typeface="Arial" panose="020B0604020202020204" pitchFamily="34" charset="0"/>
               </a:rPr>
-              <a:t>.</a:t>
-            </a:r>
-            <a:r>
-              <a:rPr lang="en-US" sz="2000" dirty="0" err="1">
-                <a:latin typeface="Arial" panose="020B0604020202020204" pitchFamily="34" charset="0"/>
-                <a:cs typeface="Arial" panose="020B0604020202020204" pitchFamily="34" charset="0"/>
-              </a:rPr>
-              <a:t>gitignore</a:t>
+              <a:t>: Species filetypes to ignore when pushing changes to codebase from local machine</a:t>
+            </a:r>
+            <a:endParaRPr lang="en-US" sz="2000" b="1" dirty="0">
+              <a:latin typeface="Arial" panose="020B0604020202020204" pitchFamily="34" charset="0"/>
+              <a:cs typeface="Arial" panose="020B0604020202020204" pitchFamily="34" charset="0"/>
+            </a:endParaRPr>
+          </a:p>
+          <a:p>
+            <a:r>
+              <a:rPr lang="en-US" sz="2400" b="1" dirty="0">
+                <a:latin typeface="Arial" panose="020B0604020202020204" pitchFamily="34" charset="0"/>
+                <a:cs typeface="Arial" panose="020B0604020202020204" pitchFamily="34" charset="0"/>
+              </a:rPr>
+              <a:t>Branches: </a:t>
+            </a:r>
+          </a:p>
+          <a:p>
+            <a:pPr lvl="1"/>
+            <a:r>
+              <a:rPr lang="en-US" sz="2000" dirty="0">
+                <a:latin typeface="Arial" panose="020B0604020202020204" pitchFamily="34" charset="0"/>
+                <a:cs typeface="Arial" panose="020B0604020202020204" pitchFamily="34" charset="0"/>
+              </a:rPr>
+              <a:t>Main</a:t>
+            </a:r>
+          </a:p>
+          <a:p>
+            <a:r>
+              <a:rPr lang="en-US" sz="2400" b="1" dirty="0">
+                <a:latin typeface="Arial" panose="020B0604020202020204" pitchFamily="34" charset="0"/>
+                <a:cs typeface="Arial" panose="020B0604020202020204" pitchFamily="34" charset="0"/>
+              </a:rPr>
+              <a:t>Commits:</a:t>
             </a:r>
             <a:endParaRPr lang="en-US" sz="2000" dirty="0">
               <a:latin typeface="Arial" panose="020B0604020202020204" pitchFamily="34" charset="0"/>
@@ -4349,39 +5187,11 @@
           </a:p>
           <a:p>
             <a:r>
-              <a:rPr lang="en-US" sz="2400" dirty="0">
-                <a:latin typeface="Arial" panose="020B0604020202020204" pitchFamily="34" charset="0"/>
-                <a:cs typeface="Arial" panose="020B0604020202020204" pitchFamily="34" charset="0"/>
-              </a:rPr>
-              <a:t>Branches</a:t>
-            </a:r>
-          </a:p>
-          <a:p>
-            <a:pPr lvl="1"/>
-            <a:r>
-              <a:rPr lang="en-US" sz="2000" dirty="0">
-                <a:latin typeface="Arial" panose="020B0604020202020204" pitchFamily="34" charset="0"/>
-                <a:cs typeface="Arial" panose="020B0604020202020204" pitchFamily="34" charset="0"/>
-              </a:rPr>
-              <a:t>Main</a:t>
-            </a:r>
-          </a:p>
-          <a:p>
-            <a:r>
-              <a:rPr lang="en-US" sz="2400" dirty="0">
-                <a:latin typeface="Arial" panose="020B0604020202020204" pitchFamily="34" charset="0"/>
-                <a:cs typeface="Arial" panose="020B0604020202020204" pitchFamily="34" charset="0"/>
-              </a:rPr>
-              <a:t>Pull Requests</a:t>
-            </a:r>
-          </a:p>
-          <a:p>
-            <a:r>
-              <a:rPr lang="en-US" sz="2400" dirty="0">
-                <a:latin typeface="Arial" panose="020B0604020202020204" pitchFamily="34" charset="0"/>
-                <a:cs typeface="Arial" panose="020B0604020202020204" pitchFamily="34" charset="0"/>
-              </a:rPr>
-              <a:t>Commit history</a:t>
+              <a:rPr lang="en-US" sz="2400" b="1" dirty="0">
+                <a:latin typeface="Arial" panose="020B0604020202020204" pitchFamily="34" charset="0"/>
+                <a:cs typeface="Arial" panose="020B0604020202020204" pitchFamily="34" charset="0"/>
+              </a:rPr>
+              <a:t>Pull Requests:</a:t>
             </a:r>
           </a:p>
           <a:p>
@@ -4406,7 +5216,7 @@
 </p:sld>
 </file>
 
-<file path=ppt/slides/slide4.xml><?xml version="1.0" encoding="utf-8"?>
+<file path=ppt/slides/slide6.xml><?xml version="1.0" encoding="utf-8"?>
 <p:sld xmlns:a="http://schemas.openxmlformats.org/drawingml/2006/main" xmlns:r="http://schemas.openxmlformats.org/officeDocument/2006/relationships" xmlns:p="http://schemas.openxmlformats.org/presentationml/2006/main">
   <p:cSld>
     <p:spTree>
@@ -4523,7 +5333,7 @@
                 <a:latin typeface="Arial" panose="020B0604020202020204" pitchFamily="34" charset="0"/>
                 <a:cs typeface="Arial" panose="020B0604020202020204" pitchFamily="34" charset="0"/>
               </a:rPr>
-              <a:t>How to get, edit, and push?</a:t>
+              <a:t>How to get, edit, and save code?</a:t>
             </a:r>
           </a:p>
         </p:txBody>
@@ -4690,7 +5500,7 @@
 </p:sld>
 </file>
 
-<file path=ppt/slides/slide5.xml><?xml version="1.0" encoding="utf-8"?>
+<file path=ppt/slides/slide7.xml><?xml version="1.0" encoding="utf-8"?>
 <p:sld xmlns:a="http://schemas.openxmlformats.org/drawingml/2006/main" xmlns:r="http://schemas.openxmlformats.org/officeDocument/2006/relationships" xmlns:p="http://schemas.openxmlformats.org/presentationml/2006/main">
   <p:cSld>
     <p:spTree>
@@ -4872,7 +5682,7 @@
                 <a:latin typeface="Arial" panose="020B0604020202020204" pitchFamily="34" charset="0"/>
                 <a:cs typeface="Arial" panose="020B0604020202020204" pitchFamily="34" charset="0"/>
               </a:rPr>
-              <a:t>git checkout</a:t>
+              <a:t>git branch &lt;BRANCH NAME&gt;</a:t>
             </a:r>
           </a:p>
           <a:p>
@@ -4893,7 +5703,7 @@
                 <a:latin typeface="Arial" panose="020B0604020202020204" pitchFamily="34" charset="0"/>
                 <a:cs typeface="Arial" panose="020B0604020202020204" pitchFamily="34" charset="0"/>
               </a:rPr>
-              <a:t>Pull Requests</a:t>
+              <a:t>git checkout &lt;BRANCH NAME&gt;</a:t>
             </a:r>
           </a:p>
           <a:p>
@@ -4909,13 +5719,65 @@
             <a:pPr marL="0" indent="0">
               <a:buNone/>
             </a:pPr>
+            <a:r>
+              <a:rPr lang="en-US" sz="2400" dirty="0">
+                <a:latin typeface="Arial" panose="020B0604020202020204" pitchFamily="34" charset="0"/>
+                <a:cs typeface="Arial" panose="020B0604020202020204" pitchFamily="34" charset="0"/>
+              </a:rPr>
+              <a:t>Pull Requests</a:t>
+            </a:r>
+          </a:p>
+          <a:p>
+            <a:pPr marL="0" indent="0">
+              <a:buNone/>
+            </a:pPr>
             <a:endParaRPr lang="en-US" sz="2400" dirty="0">
               <a:latin typeface="Arial" panose="020B0604020202020204" pitchFamily="34" charset="0"/>
               <a:cs typeface="Arial" panose="020B0604020202020204" pitchFamily="34" charset="0"/>
             </a:endParaRPr>
           </a:p>
-        </p:txBody>
-      </p:sp>
+          <a:p>
+            <a:pPr marL="0" indent="0">
+              <a:buNone/>
+            </a:pPr>
+            <a:endParaRPr lang="en-US" sz="2400" dirty="0">
+              <a:latin typeface="Arial" panose="020B0604020202020204" pitchFamily="34" charset="0"/>
+              <a:cs typeface="Arial" panose="020B0604020202020204" pitchFamily="34" charset="0"/>
+            </a:endParaRPr>
+          </a:p>
+        </p:txBody>
+      </p:sp>
+      <p:pic>
+        <p:nvPicPr>
+          <p:cNvPr id="3" name="Picture 2" descr="A screenshot of a black screen&#10;&#10;AI-generated content may be incorrect.">
+            <a:extLst>
+              <a:ext uri="{FF2B5EF4-FFF2-40B4-BE49-F238E27FC236}">
+                <a16:creationId xmlns:a16="http://schemas.microsoft.com/office/drawing/2014/main" id="{DBBAACB9-DB66-2BCF-704B-449BD2D80B47}"/>
+              </a:ext>
+            </a:extLst>
+          </p:cNvPr>
+          <p:cNvPicPr>
+            <a:picLocks noChangeAspect="1"/>
+          </p:cNvPicPr>
+          <p:nvPr/>
+        </p:nvPicPr>
+        <p:blipFill>
+          <a:blip r:embed="rId2"/>
+          <a:srcRect t="44993"/>
+          <a:stretch>
+            <a:fillRect/>
+          </a:stretch>
+        </p:blipFill>
+        <p:spPr>
+          <a:xfrm>
+            <a:off x="5346699" y="851581"/>
+            <a:ext cx="6769100" cy="2459038"/>
+          </a:xfrm>
+          <a:prstGeom prst="rect">
+            <a:avLst/>
+          </a:prstGeom>
+        </p:spPr>
+      </p:pic>
     </p:spTree>
     <p:extLst>
       <p:ext uri="{BB962C8B-B14F-4D97-AF65-F5344CB8AC3E}">
@@ -4929,7 +5791,7 @@
 </p:sld>
 </file>
 
-<file path=ppt/slides/slide6.xml><?xml version="1.0" encoding="utf-8"?>
+<file path=ppt/slides/slide8.xml><?xml version="1.0" encoding="utf-8"?>
 <p:sld xmlns:a="http://schemas.openxmlformats.org/drawingml/2006/main" xmlns:r="http://schemas.openxmlformats.org/officeDocument/2006/relationships" xmlns:p="http://schemas.openxmlformats.org/presentationml/2006/main">
   <p:cSld>
     <p:spTree>
@@ -5087,7 +5949,7 @@
                 <a:latin typeface="Arial" panose="020B0604020202020204" pitchFamily="34" charset="0"/>
                 <a:cs typeface="Arial" panose="020B0604020202020204" pitchFamily="34" charset="0"/>
               </a:rPr>
-              <a:t>Team</a:t>
+              <a:t>Tasks</a:t>
             </a:r>
           </a:p>
           <a:p>
@@ -5097,7 +5959,7 @@
                 <a:latin typeface="Arial" panose="020B0604020202020204" pitchFamily="34" charset="0"/>
                 <a:cs typeface="Arial" panose="020B0604020202020204" pitchFamily="34" charset="0"/>
               </a:rPr>
-              <a:t>James</a:t>
+              <a:t>James: add</a:t>
             </a:r>
           </a:p>
           <a:p>
@@ -5107,7 +5969,7 @@
                 <a:latin typeface="Arial" panose="020B0604020202020204" pitchFamily="34" charset="0"/>
                 <a:cs typeface="Arial" panose="020B0604020202020204" pitchFamily="34" charset="0"/>
               </a:rPr>
-              <a:t>Iana</a:t>
+              <a:t>Iana: subtract</a:t>
             </a:r>
           </a:p>
           <a:p>
@@ -5117,7 +5979,7 @@
                 <a:latin typeface="Arial" panose="020B0604020202020204" pitchFamily="34" charset="0"/>
                 <a:cs typeface="Arial" panose="020B0604020202020204" pitchFamily="34" charset="0"/>
               </a:rPr>
-              <a:t>Sydney</a:t>
+              <a:t>Sydney: divide</a:t>
             </a:r>
           </a:p>
           <a:p>
@@ -5127,7 +5989,7 @@
                 <a:latin typeface="Arial" panose="020B0604020202020204" pitchFamily="34" charset="0"/>
                 <a:cs typeface="Arial" panose="020B0604020202020204" pitchFamily="34" charset="0"/>
               </a:rPr>
-              <a:t>Laura</a:t>
+              <a:t>Alex: multiply</a:t>
             </a:r>
           </a:p>
           <a:p>
@@ -5137,7 +5999,17 @@
                 <a:latin typeface="Arial" panose="020B0604020202020204" pitchFamily="34" charset="0"/>
                 <a:cs typeface="Arial" panose="020B0604020202020204" pitchFamily="34" charset="0"/>
               </a:rPr>
-              <a:t>Alex</a:t>
+              <a:t>Eric: square</a:t>
+            </a:r>
+          </a:p>
+          <a:p>
+            <a:pPr lvl="1"/>
+            <a:r>
+              <a:rPr lang="en-US" dirty="0">
+                <a:latin typeface="Arial" panose="020B0604020202020204" pitchFamily="34" charset="0"/>
+                <a:cs typeface="Arial" panose="020B0604020202020204" pitchFamily="34" charset="0"/>
+              </a:rPr>
+              <a:t>Eliot: increment</a:t>
             </a:r>
           </a:p>
         </p:txBody>

</xml_diff>

<commit_message>
minor git code and slides edits.
</commit_message>
<xml_diff>
--- a/slides/git_slides.pptx
+++ b/slides/git_slides.pptx
@@ -5944,6 +5944,27 @@
           </a:bodyPr>
           <a:lstStyle/>
           <a:p>
+            <a:pPr marL="457200" indent="-457200">
+              <a:buFont typeface="+mj-lt"/>
+              <a:buAutoNum type="arabicPeriod"/>
+            </a:pPr>
+            <a:r>
+              <a:rPr lang="en-US" sz="2400" b="1">
+                <a:latin typeface="Arial" panose="020B0604020202020204" pitchFamily="34" charset="0"/>
+                <a:cs typeface="Arial" panose="020B0604020202020204" pitchFamily="34" charset="0"/>
+              </a:rPr>
+              <a:t>Clone repo!</a:t>
+            </a:r>
+            <a:endParaRPr lang="en-US" sz="2400" b="1" dirty="0">
+              <a:latin typeface="Arial" panose="020B0604020202020204" pitchFamily="34" charset="0"/>
+              <a:cs typeface="Arial" panose="020B0604020202020204" pitchFamily="34" charset="0"/>
+            </a:endParaRPr>
+          </a:p>
+          <a:p>
+            <a:pPr marL="457200" indent="-457200">
+              <a:buFont typeface="+mj-lt"/>
+              <a:buAutoNum type="arabicPeriod"/>
+            </a:pPr>
             <a:r>
               <a:rPr lang="en-US" sz="2400" b="1" dirty="0">
                 <a:latin typeface="Arial" panose="020B0604020202020204" pitchFamily="34" charset="0"/>
@@ -5999,7 +6020,7 @@
                 <a:latin typeface="Arial" panose="020B0604020202020204" pitchFamily="34" charset="0"/>
                 <a:cs typeface="Arial" panose="020B0604020202020204" pitchFamily="34" charset="0"/>
               </a:rPr>
-              <a:t>Eric: square</a:t>
+              <a:t>Eric: exponent</a:t>
             </a:r>
           </a:p>
           <a:p>

</xml_diff>

<commit_message>
Added modulo function to git code.
</commit_message>
<xml_diff>
--- a/slides/git_slides.pptx
+++ b/slides/git_slides.pptx
@@ -5949,16 +5949,12 @@
               <a:buAutoNum type="arabicPeriod"/>
             </a:pPr>
             <a:r>
-              <a:rPr lang="en-US" sz="2400" b="1">
+              <a:rPr lang="en-US" sz="2400" b="1" dirty="0">
                 <a:latin typeface="Arial" panose="020B0604020202020204" pitchFamily="34" charset="0"/>
                 <a:cs typeface="Arial" panose="020B0604020202020204" pitchFamily="34" charset="0"/>
               </a:rPr>
               <a:t>Clone repo!</a:t>
             </a:r>
-            <a:endParaRPr lang="en-US" sz="2400" b="1" dirty="0">
-              <a:latin typeface="Arial" panose="020B0604020202020204" pitchFamily="34" charset="0"/>
-              <a:cs typeface="Arial" panose="020B0604020202020204" pitchFamily="34" charset="0"/>
-            </a:endParaRPr>
           </a:p>
           <a:p>
             <a:pPr marL="457200" indent="-457200">
@@ -6030,7 +6026,7 @@
                 <a:latin typeface="Arial" panose="020B0604020202020204" pitchFamily="34" charset="0"/>
                 <a:cs typeface="Arial" panose="020B0604020202020204" pitchFamily="34" charset="0"/>
               </a:rPr>
-              <a:t>Eliot: increment</a:t>
+              <a:t>Eliot: mod</a:t>
             </a:r>
           </a:p>
         </p:txBody>

</xml_diff>

<commit_message>
Added repo image to slides.
</commit_message>
<xml_diff>
--- a/slides/git_slides.pptx
+++ b/slides/git_slides.pptx
@@ -3879,6 +3879,29 @@
               <a:t>Eliot Kim, Eric Mei</a:t>
             </a:r>
           </a:p>
+          <a:p>
+            <a:r>
+              <a:rPr lang="en-US" sz="3000" b="1" dirty="0">
+                <a:latin typeface="Arial" panose="020B0604020202020204" pitchFamily="34" charset="0"/>
+                <a:cs typeface="Arial" panose="020B0604020202020204" pitchFamily="34" charset="0"/>
+              </a:rPr>
+              <a:t>August 27</a:t>
+            </a:r>
+            <a:r>
+              <a:rPr lang="en-US" sz="3000" b="1" baseline="30000" dirty="0">
+                <a:latin typeface="Arial" panose="020B0604020202020204" pitchFamily="34" charset="0"/>
+                <a:cs typeface="Arial" panose="020B0604020202020204" pitchFamily="34" charset="0"/>
+              </a:rPr>
+              <a:t>th</a:t>
+            </a:r>
+            <a:r>
+              <a:rPr lang="en-US" sz="3000" b="1" dirty="0">
+                <a:latin typeface="Arial" panose="020B0604020202020204" pitchFamily="34" charset="0"/>
+                <a:cs typeface="Arial" panose="020B0604020202020204" pitchFamily="34" charset="0"/>
+              </a:rPr>
+              <a:t>, 2025</a:t>
+            </a:r>
+          </a:p>
         </p:txBody>
       </p:sp>
     </p:spTree>
@@ -4990,7 +5013,7 @@
                 <a:latin typeface="Arial" panose="020B0604020202020204" pitchFamily="34" charset="0"/>
                 <a:cs typeface="Arial" panose="020B0604020202020204" pitchFamily="34" charset="0"/>
               </a:rPr>
-              <a:t>1</a:t>
+              <a:t>2</a:t>
             </a:r>
           </a:p>
         </p:txBody>
@@ -5076,8 +5099,8 @@
         </p:nvSpPr>
         <p:spPr>
           <a:xfrm>
-            <a:off x="76199" y="851581"/>
-            <a:ext cx="12039600" cy="5731300"/>
+            <a:off x="76198" y="3503147"/>
+            <a:ext cx="12039600" cy="3097456"/>
           </a:xfrm>
           <a:ln>
             <a:noFill/>
@@ -5203,6 +5226,37 @@
           </a:p>
         </p:txBody>
       </p:sp>
+      <p:pic>
+        <p:nvPicPr>
+          <p:cNvPr id="3" name="Picture 2" descr="A screenshot of a computer&#10;&#10;AI-generated content may be incorrect.">
+            <a:extLst>
+              <a:ext uri="{FF2B5EF4-FFF2-40B4-BE49-F238E27FC236}">
+                <a16:creationId xmlns:a16="http://schemas.microsoft.com/office/drawing/2014/main" id="{8453B5C8-B367-484D-4740-D7FF36D1E95E}"/>
+              </a:ext>
+            </a:extLst>
+          </p:cNvPr>
+          <p:cNvPicPr>
+            <a:picLocks noChangeAspect="1"/>
+          </p:cNvPicPr>
+          <p:nvPr/>
+        </p:nvPicPr>
+        <p:blipFill>
+          <a:blip r:embed="rId2"/>
+          <a:srcRect t="30050" b="1980"/>
+          <a:stretch>
+            <a:fillRect/>
+          </a:stretch>
+        </p:blipFill>
+        <p:spPr>
+          <a:xfrm>
+            <a:off x="2332336" y="846433"/>
+            <a:ext cx="7527325" cy="2508421"/>
+          </a:xfrm>
+          <a:prstGeom prst="rect">
+            <a:avLst/>
+          </a:prstGeom>
+        </p:spPr>
+      </p:pic>
     </p:spTree>
     <p:extLst>
       <p:ext uri="{BB962C8B-B14F-4D97-AF65-F5344CB8AC3E}">
@@ -5270,7 +5324,7 @@
                 <a:latin typeface="Arial" panose="020B0604020202020204" pitchFamily="34" charset="0"/>
                 <a:cs typeface="Arial" panose="020B0604020202020204" pitchFamily="34" charset="0"/>
               </a:rPr>
-              <a:t>1</a:t>
+              <a:t>3</a:t>
             </a:r>
           </a:p>
         </p:txBody>
@@ -5373,7 +5427,13 @@
               <a:buNone/>
             </a:pPr>
             <a:r>
-              <a:rPr lang="en-US" sz="2400" dirty="0">
+              <a:rPr lang="en-US" sz="2400" b="1" dirty="0">
+                <a:solidFill>
+                  <a:schemeClr val="tx2">
+                    <a:lumMod val="75000"/>
+                    <a:lumOff val="25000"/>
+                  </a:schemeClr>
+                </a:solidFill>
                 <a:latin typeface="Arial" panose="020B0604020202020204" pitchFamily="34" charset="0"/>
                 <a:cs typeface="Arial" panose="020B0604020202020204" pitchFamily="34" charset="0"/>
               </a:rPr>
@@ -5381,108 +5441,161 @@
             </a:r>
           </a:p>
           <a:p>
+            <a:r>
+              <a:rPr lang="en-US" sz="2400" i="1" dirty="0">
+                <a:latin typeface="Arial" panose="020B0604020202020204" pitchFamily="34" charset="0"/>
+                <a:cs typeface="Arial" panose="020B0604020202020204" pitchFamily="34" charset="0"/>
+              </a:rPr>
+              <a:t>Copy repo to local machine</a:t>
+            </a:r>
+          </a:p>
+          <a:p>
             <a:pPr marL="0" indent="0">
               <a:buNone/>
             </a:pPr>
-            <a:endParaRPr lang="en-US" sz="2400" dirty="0">
-              <a:latin typeface="Arial" panose="020B0604020202020204" pitchFamily="34" charset="0"/>
-              <a:cs typeface="Arial" panose="020B0604020202020204" pitchFamily="34" charset="0"/>
-            </a:endParaRPr>
+            <a:r>
+              <a:rPr lang="en-US" sz="2400" b="1" dirty="0">
+                <a:solidFill>
+                  <a:schemeClr val="tx2">
+                    <a:lumMod val="75000"/>
+                    <a:lumOff val="25000"/>
+                  </a:schemeClr>
+                </a:solidFill>
+                <a:latin typeface="Arial" panose="020B0604020202020204" pitchFamily="34" charset="0"/>
+                <a:cs typeface="Arial" panose="020B0604020202020204" pitchFamily="34" charset="0"/>
+              </a:rPr>
+              <a:t>git status</a:t>
+            </a:r>
+          </a:p>
+          <a:p>
+            <a:r>
+              <a:rPr lang="en-US" sz="2400" i="1" dirty="0">
+                <a:latin typeface="Arial" panose="020B0604020202020204" pitchFamily="34" charset="0"/>
+                <a:cs typeface="Arial" panose="020B0604020202020204" pitchFamily="34" charset="0"/>
+              </a:rPr>
+              <a:t>Check which files have been changed / </a:t>
+            </a:r>
+            <a:r>
+              <a:rPr lang="en-US" sz="2400" i="1" dirty="0" err="1">
+                <a:latin typeface="Arial" panose="020B0604020202020204" pitchFamily="34" charset="0"/>
+                <a:cs typeface="Arial" panose="020B0604020202020204" pitchFamily="34" charset="0"/>
+              </a:rPr>
+              <a:t>unstaged</a:t>
+            </a:r>
+            <a:r>
+              <a:rPr lang="en-US" sz="2400" i="1" dirty="0">
+                <a:latin typeface="Arial" panose="020B0604020202020204" pitchFamily="34" charset="0"/>
+                <a:cs typeface="Arial" panose="020B0604020202020204" pitchFamily="34" charset="0"/>
+              </a:rPr>
+              <a:t> / staged</a:t>
+            </a:r>
           </a:p>
           <a:p>
             <a:pPr marL="0" indent="0">
               <a:buNone/>
             </a:pPr>
             <a:r>
-              <a:rPr lang="en-US" sz="2400" dirty="0">
-                <a:latin typeface="Arial" panose="020B0604020202020204" pitchFamily="34" charset="0"/>
-                <a:cs typeface="Arial" panose="020B0604020202020204" pitchFamily="34" charset="0"/>
-              </a:rPr>
-              <a:t>git status</a:t>
+              <a:rPr lang="en-US" sz="2400" b="1" dirty="0">
+                <a:solidFill>
+                  <a:schemeClr val="tx2">
+                    <a:lumMod val="75000"/>
+                    <a:lumOff val="25000"/>
+                  </a:schemeClr>
+                </a:solidFill>
+                <a:latin typeface="Arial" panose="020B0604020202020204" pitchFamily="34" charset="0"/>
+                <a:cs typeface="Arial" panose="020B0604020202020204" pitchFamily="34" charset="0"/>
+              </a:rPr>
+              <a:t>git add &lt;FILEPATH&gt;</a:t>
+            </a:r>
+          </a:p>
+          <a:p>
+            <a:r>
+              <a:rPr lang="en-US" sz="2400" i="1" dirty="0">
+                <a:latin typeface="Arial" panose="020B0604020202020204" pitchFamily="34" charset="0"/>
+                <a:cs typeface="Arial" panose="020B0604020202020204" pitchFamily="34" charset="0"/>
+              </a:rPr>
+              <a:t>Stage file(s)</a:t>
             </a:r>
           </a:p>
           <a:p>
             <a:pPr marL="0" indent="0">
               <a:buNone/>
             </a:pPr>
-            <a:endParaRPr lang="en-US" sz="2400" dirty="0">
-              <a:latin typeface="Arial" panose="020B0604020202020204" pitchFamily="34" charset="0"/>
-              <a:cs typeface="Arial" panose="020B0604020202020204" pitchFamily="34" charset="0"/>
-            </a:endParaRPr>
+            <a:r>
+              <a:rPr lang="en-US" sz="2400" b="1" dirty="0">
+                <a:solidFill>
+                  <a:schemeClr val="tx2">
+                    <a:lumMod val="75000"/>
+                    <a:lumOff val="25000"/>
+                  </a:schemeClr>
+                </a:solidFill>
+                <a:latin typeface="Arial" panose="020B0604020202020204" pitchFamily="34" charset="0"/>
+                <a:cs typeface="Arial" panose="020B0604020202020204" pitchFamily="34" charset="0"/>
+              </a:rPr>
+              <a:t>git commit –m &lt;MESSAGE&gt;</a:t>
+            </a:r>
+          </a:p>
+          <a:p>
+            <a:r>
+              <a:rPr lang="en-US" sz="2400" i="1" dirty="0">
+                <a:latin typeface="Arial" panose="020B0604020202020204" pitchFamily="34" charset="0"/>
+                <a:cs typeface="Arial" panose="020B0604020202020204" pitchFamily="34" charset="0"/>
+              </a:rPr>
+              <a:t>Add committed file(s) to </a:t>
+            </a:r>
           </a:p>
           <a:p>
             <a:pPr marL="0" indent="0">
               <a:buNone/>
             </a:pPr>
             <a:r>
-              <a:rPr lang="en-US" sz="2400" dirty="0">
-                <a:latin typeface="Arial" panose="020B0604020202020204" pitchFamily="34" charset="0"/>
-                <a:cs typeface="Arial" panose="020B0604020202020204" pitchFamily="34" charset="0"/>
-              </a:rPr>
-              <a:t>git add &lt;FILEPATH&gt;</a:t>
+              <a:rPr lang="en-US" sz="2400" b="1" dirty="0">
+                <a:solidFill>
+                  <a:schemeClr val="tx2">
+                    <a:lumMod val="75000"/>
+                    <a:lumOff val="25000"/>
+                  </a:schemeClr>
+                </a:solidFill>
+                <a:latin typeface="Arial" panose="020B0604020202020204" pitchFamily="34" charset="0"/>
+                <a:cs typeface="Arial" panose="020B0604020202020204" pitchFamily="34" charset="0"/>
+              </a:rPr>
+              <a:t>git push</a:t>
+            </a:r>
+          </a:p>
+          <a:p>
+            <a:r>
+              <a:rPr lang="en-US" sz="2400" i="1" dirty="0">
+                <a:latin typeface="Arial" panose="020B0604020202020204" pitchFamily="34" charset="0"/>
+                <a:cs typeface="Arial" panose="020B0604020202020204" pitchFamily="34" charset="0"/>
+              </a:rPr>
+              <a:t>Update codebase with committed file(s)</a:t>
             </a:r>
           </a:p>
           <a:p>
             <a:pPr marL="0" indent="0">
               <a:buNone/>
             </a:pPr>
-            <a:endParaRPr lang="en-US" sz="2400" dirty="0">
-              <a:latin typeface="Arial" panose="020B0604020202020204" pitchFamily="34" charset="0"/>
-              <a:cs typeface="Arial" panose="020B0604020202020204" pitchFamily="34" charset="0"/>
-            </a:endParaRPr>
-          </a:p>
-          <a:p>
-            <a:pPr marL="0" indent="0">
-              <a:buNone/>
-            </a:pPr>
-            <a:r>
-              <a:rPr lang="en-US" sz="2400" dirty="0">
-                <a:latin typeface="Arial" panose="020B0604020202020204" pitchFamily="34" charset="0"/>
-                <a:cs typeface="Arial" panose="020B0604020202020204" pitchFamily="34" charset="0"/>
-              </a:rPr>
-              <a:t>git commit –m &lt;MESSAGE&gt;</a:t>
-            </a:r>
-          </a:p>
-          <a:p>
-            <a:pPr marL="0" indent="0">
-              <a:buNone/>
-            </a:pPr>
-            <a:endParaRPr lang="en-US" sz="2400" dirty="0">
-              <a:latin typeface="Arial" panose="020B0604020202020204" pitchFamily="34" charset="0"/>
-              <a:cs typeface="Arial" panose="020B0604020202020204" pitchFamily="34" charset="0"/>
-            </a:endParaRPr>
-          </a:p>
-          <a:p>
-            <a:pPr marL="0" indent="0">
-              <a:buNone/>
-            </a:pPr>
-            <a:r>
-              <a:rPr lang="en-US" sz="2400" dirty="0">
-                <a:latin typeface="Arial" panose="020B0604020202020204" pitchFamily="34" charset="0"/>
-                <a:cs typeface="Arial" panose="020B0604020202020204" pitchFamily="34" charset="0"/>
-              </a:rPr>
-              <a:t>git push</a:t>
-            </a:r>
-          </a:p>
-          <a:p>
-            <a:pPr marL="0" indent="0">
-              <a:buNone/>
-            </a:pPr>
-            <a:endParaRPr lang="en-US" sz="2400" dirty="0">
-              <a:latin typeface="Arial" panose="020B0604020202020204" pitchFamily="34" charset="0"/>
-              <a:cs typeface="Arial" panose="020B0604020202020204" pitchFamily="34" charset="0"/>
-            </a:endParaRPr>
-          </a:p>
-          <a:p>
-            <a:pPr marL="0" indent="0">
-              <a:buNone/>
-            </a:pPr>
-            <a:r>
-              <a:rPr lang="en-US" sz="2400" dirty="0">
+            <a:r>
+              <a:rPr lang="en-US" sz="2400" b="1" dirty="0">
+                <a:solidFill>
+                  <a:schemeClr val="tx2">
+                    <a:lumMod val="75000"/>
+                    <a:lumOff val="25000"/>
+                  </a:schemeClr>
+                </a:solidFill>
                 <a:latin typeface="Arial" panose="020B0604020202020204" pitchFamily="34" charset="0"/>
                 <a:cs typeface="Arial" panose="020B0604020202020204" pitchFamily="34" charset="0"/>
               </a:rPr>
               <a:t>git pull</a:t>
+            </a:r>
+          </a:p>
+          <a:p>
+            <a:r>
+              <a:rPr lang="en-US" sz="2400" i="1" dirty="0">
+                <a:latin typeface="Arial" panose="020B0604020202020204" pitchFamily="34" charset="0"/>
+                <a:cs typeface="Arial" panose="020B0604020202020204" pitchFamily="34" charset="0"/>
+              </a:rPr>
+              <a:t>Get codebase updates from remote to local</a:t>
             </a:r>
           </a:p>
         </p:txBody>
@@ -5554,7 +5667,7 @@
                 <a:latin typeface="Arial" panose="020B0604020202020204" pitchFamily="34" charset="0"/>
                 <a:cs typeface="Arial" panose="020B0604020202020204" pitchFamily="34" charset="0"/>
               </a:rPr>
-              <a:t>1</a:t>
+              <a:t>4</a:t>
             </a:r>
           </a:p>
         </p:txBody>
@@ -5640,8 +5753,8 @@
         </p:nvSpPr>
         <p:spPr>
           <a:xfrm>
-            <a:off x="76199" y="851581"/>
-            <a:ext cx="12039600" cy="5731300"/>
+            <a:off x="76199" y="3310619"/>
+            <a:ext cx="12039600" cy="3243587"/>
           </a:xfrm>
           <a:ln>
             <a:noFill/>
@@ -5657,7 +5770,13 @@
               <a:buNone/>
             </a:pPr>
             <a:r>
-              <a:rPr lang="en-US" sz="2400" dirty="0">
+              <a:rPr lang="en-US" sz="2400" b="1" dirty="0">
+                <a:solidFill>
+                  <a:schemeClr val="tx2">
+                    <a:lumMod val="75000"/>
+                    <a:lumOff val="25000"/>
+                  </a:schemeClr>
+                </a:solidFill>
                 <a:latin typeface="Arial" panose="020B0604020202020204" pitchFamily="34" charset="0"/>
                 <a:cs typeface="Arial" panose="020B0604020202020204" pitchFamily="34" charset="0"/>
               </a:rPr>
@@ -5665,66 +5784,78 @@
             </a:r>
           </a:p>
           <a:p>
+            <a:r>
+              <a:rPr lang="en-US" sz="2400" i="1" dirty="0">
+                <a:latin typeface="Arial" panose="020B0604020202020204" pitchFamily="34" charset="0"/>
+                <a:cs typeface="Arial" panose="020B0604020202020204" pitchFamily="34" charset="0"/>
+              </a:rPr>
+              <a:t>Check current branch and available branches</a:t>
+            </a:r>
+          </a:p>
+          <a:p>
             <a:pPr marL="0" indent="0">
               <a:buNone/>
             </a:pPr>
-            <a:endParaRPr lang="en-US" sz="2400" dirty="0">
-              <a:latin typeface="Arial" panose="020B0604020202020204" pitchFamily="34" charset="0"/>
-              <a:cs typeface="Arial" panose="020B0604020202020204" pitchFamily="34" charset="0"/>
-            </a:endParaRPr>
+            <a:r>
+              <a:rPr lang="en-US" sz="2400" b="1" dirty="0">
+                <a:solidFill>
+                  <a:schemeClr val="tx2">
+                    <a:lumMod val="75000"/>
+                    <a:lumOff val="25000"/>
+                  </a:schemeClr>
+                </a:solidFill>
+                <a:latin typeface="Arial" panose="020B0604020202020204" pitchFamily="34" charset="0"/>
+                <a:cs typeface="Arial" panose="020B0604020202020204" pitchFamily="34" charset="0"/>
+              </a:rPr>
+              <a:t>git branch &lt;BRANCH NAME&gt;</a:t>
+            </a:r>
+          </a:p>
+          <a:p>
+            <a:r>
+              <a:rPr lang="en-US" sz="2400" i="1" dirty="0">
+                <a:latin typeface="Arial" panose="020B0604020202020204" pitchFamily="34" charset="0"/>
+                <a:cs typeface="Arial" panose="020B0604020202020204" pitchFamily="34" charset="0"/>
+              </a:rPr>
+              <a:t>Make a new branch</a:t>
+            </a:r>
           </a:p>
           <a:p>
             <a:pPr marL="0" indent="0">
               <a:buNone/>
             </a:pPr>
             <a:r>
-              <a:rPr lang="en-US" sz="2400" dirty="0">
-                <a:latin typeface="Arial" panose="020B0604020202020204" pitchFamily="34" charset="0"/>
-                <a:cs typeface="Arial" panose="020B0604020202020204" pitchFamily="34" charset="0"/>
-              </a:rPr>
-              <a:t>git branch &lt;BRANCH NAME&gt;</a:t>
+              <a:rPr lang="en-US" sz="2400" b="1" dirty="0">
+                <a:solidFill>
+                  <a:schemeClr val="tx2">
+                    <a:lumMod val="75000"/>
+                    <a:lumOff val="25000"/>
+                  </a:schemeClr>
+                </a:solidFill>
+                <a:latin typeface="Arial" panose="020B0604020202020204" pitchFamily="34" charset="0"/>
+                <a:cs typeface="Arial" panose="020B0604020202020204" pitchFamily="34" charset="0"/>
+              </a:rPr>
+              <a:t>git checkout &lt;BRANCH NAME&gt;</a:t>
+            </a:r>
+          </a:p>
+          <a:p>
+            <a:r>
+              <a:rPr lang="en-US" sz="2400" i="1" dirty="0">
+                <a:latin typeface="Arial" panose="020B0604020202020204" pitchFamily="34" charset="0"/>
+                <a:cs typeface="Arial" panose="020B0604020202020204" pitchFamily="34" charset="0"/>
+              </a:rPr>
+              <a:t>Hop to a branch</a:t>
             </a:r>
           </a:p>
           <a:p>
             <a:pPr marL="0" indent="0">
               <a:buNone/>
             </a:pPr>
-            <a:endParaRPr lang="en-US" sz="2400" dirty="0">
-              <a:latin typeface="Arial" panose="020B0604020202020204" pitchFamily="34" charset="0"/>
-              <a:cs typeface="Arial" panose="020B0604020202020204" pitchFamily="34" charset="0"/>
-            </a:endParaRPr>
-          </a:p>
-          <a:p>
-            <a:pPr marL="0" indent="0">
-              <a:buNone/>
-            </a:pPr>
-            <a:r>
-              <a:rPr lang="en-US" sz="2400" dirty="0">
-                <a:latin typeface="Arial" panose="020B0604020202020204" pitchFamily="34" charset="0"/>
-                <a:cs typeface="Arial" panose="020B0604020202020204" pitchFamily="34" charset="0"/>
-              </a:rPr>
-              <a:t>git checkout &lt;BRANCH NAME&gt;</a:t>
-            </a:r>
-          </a:p>
-          <a:p>
-            <a:pPr marL="0" indent="0">
-              <a:buNone/>
-            </a:pPr>
-            <a:endParaRPr lang="en-US" sz="2400" dirty="0">
-              <a:latin typeface="Arial" panose="020B0604020202020204" pitchFamily="34" charset="0"/>
-              <a:cs typeface="Arial" panose="020B0604020202020204" pitchFamily="34" charset="0"/>
-            </a:endParaRPr>
-          </a:p>
-          <a:p>
-            <a:pPr marL="0" indent="0">
-              <a:buNone/>
-            </a:pPr>
-            <a:r>
-              <a:rPr lang="en-US" sz="2400" dirty="0">
-                <a:latin typeface="Arial" panose="020B0604020202020204" pitchFamily="34" charset="0"/>
-                <a:cs typeface="Arial" panose="020B0604020202020204" pitchFamily="34" charset="0"/>
-              </a:rPr>
-              <a:t>Pull Requests</a:t>
+            <a:r>
+              <a:rPr lang="en-US" sz="2400" b="1" dirty="0">
+                <a:latin typeface="Arial" panose="020B0604020202020204" pitchFamily="34" charset="0"/>
+                <a:cs typeface="Arial" panose="020B0604020202020204" pitchFamily="34" charset="0"/>
+              </a:rPr>
+              <a:t>Pull Requests: </a:t>
             </a:r>
           </a:p>
           <a:p>
@@ -5770,7 +5901,7 @@
         </p:blipFill>
         <p:spPr>
           <a:xfrm>
-            <a:off x="5346699" y="851581"/>
+            <a:off x="2711449" y="851581"/>
             <a:ext cx="6769100" cy="2459038"/>
           </a:xfrm>
           <a:prstGeom prst="rect">
@@ -5845,7 +5976,7 @@
                 <a:latin typeface="Arial" panose="020B0604020202020204" pitchFamily="34" charset="0"/>
                 <a:cs typeface="Arial" panose="020B0604020202020204" pitchFamily="34" charset="0"/>
               </a:rPr>
-              <a:t>1</a:t>
+              <a:t>5</a:t>
             </a:r>
           </a:p>
         </p:txBody>
@@ -5961,13 +6092,88 @@
               <a:buFont typeface="+mj-lt"/>
               <a:buAutoNum type="arabicPeriod"/>
             </a:pPr>
+            <a:endParaRPr lang="en-US" sz="2400" b="1" dirty="0">
+              <a:latin typeface="Arial" panose="020B0604020202020204" pitchFamily="34" charset="0"/>
+              <a:cs typeface="Arial" panose="020B0604020202020204" pitchFamily="34" charset="0"/>
+            </a:endParaRPr>
+          </a:p>
+          <a:p>
+            <a:pPr marL="0" indent="0" algn="ctr">
+              <a:buNone/>
+            </a:pPr>
+            <a:r>
+              <a:rPr lang="en-US" sz="3000" b="1" dirty="0" err="1">
+                <a:latin typeface="Arial" panose="020B0604020202020204" pitchFamily="34" charset="0"/>
+                <a:cs typeface="Arial" panose="020B0604020202020204" pitchFamily="34" charset="0"/>
+              </a:rPr>
+              <a:t>github.com</a:t>
+            </a:r>
+            <a:r>
+              <a:rPr lang="en-US" sz="3000" b="1" dirty="0">
+                <a:latin typeface="Arial" panose="020B0604020202020204" pitchFamily="34" charset="0"/>
+                <a:cs typeface="Arial" panose="020B0604020202020204" pitchFamily="34" charset="0"/>
+              </a:rPr>
+              <a:t>/</a:t>
+            </a:r>
+            <a:r>
+              <a:rPr lang="en-US" sz="3000" b="1" dirty="0" err="1">
+                <a:latin typeface="Arial" panose="020B0604020202020204" pitchFamily="34" charset="0"/>
+                <a:cs typeface="Arial" panose="020B0604020202020204" pitchFamily="34" charset="0"/>
+              </a:rPr>
+              <a:t>ericjmei</a:t>
+            </a:r>
+            <a:r>
+              <a:rPr lang="en-US" sz="3000" b="1" dirty="0">
+                <a:latin typeface="Arial" panose="020B0604020202020204" pitchFamily="34" charset="0"/>
+                <a:cs typeface="Arial" panose="020B0604020202020204" pitchFamily="34" charset="0"/>
+              </a:rPr>
+              <a:t>/</a:t>
+            </a:r>
+            <a:r>
+              <a:rPr lang="en-US" sz="3000" b="1" dirty="0" err="1">
+                <a:latin typeface="Arial" panose="020B0604020202020204" pitchFamily="34" charset="0"/>
+                <a:cs typeface="Arial" panose="020B0604020202020204" pitchFamily="34" charset="0"/>
+              </a:rPr>
+              <a:t>git_python_workshop</a:t>
+            </a:r>
+            <a:endParaRPr lang="en-US" sz="2400" b="1" dirty="0">
+              <a:latin typeface="Arial" panose="020B0604020202020204" pitchFamily="34" charset="0"/>
+              <a:cs typeface="Arial" panose="020B0604020202020204" pitchFamily="34" charset="0"/>
+            </a:endParaRPr>
+          </a:p>
+          <a:p>
+            <a:pPr marL="457200" indent="-457200">
+              <a:buFont typeface="+mj-lt"/>
+              <a:buAutoNum type="arabicPeriod"/>
+            </a:pPr>
+            <a:endParaRPr lang="en-US" sz="2400" b="1" dirty="0">
+              <a:latin typeface="Arial" panose="020B0604020202020204" pitchFamily="34" charset="0"/>
+              <a:cs typeface="Arial" panose="020B0604020202020204" pitchFamily="34" charset="0"/>
+            </a:endParaRPr>
+          </a:p>
+          <a:p>
+            <a:pPr marL="457200" indent="-457200">
+              <a:buFont typeface="+mj-lt"/>
+              <a:buAutoNum type="arabicPeriod" startAt="2"/>
+            </a:pPr>
             <a:r>
               <a:rPr lang="en-US" sz="2400" b="1" dirty="0">
                 <a:latin typeface="Arial" panose="020B0604020202020204" pitchFamily="34" charset="0"/>
                 <a:cs typeface="Arial" panose="020B0604020202020204" pitchFamily="34" charset="0"/>
               </a:rPr>
-              <a:t>Tasks</a:t>
-            </a:r>
+              <a:t>Write and push edits to a function in </a:t>
+            </a:r>
+            <a:r>
+              <a:rPr lang="en-US" sz="2400" b="1" i="1" dirty="0" err="1">
+                <a:latin typeface="Arial" panose="020B0604020202020204" pitchFamily="34" charset="0"/>
+                <a:cs typeface="Arial" panose="020B0604020202020204" pitchFamily="34" charset="0"/>
+              </a:rPr>
+              <a:t>git_intro.py</a:t>
+            </a:r>
+            <a:endParaRPr lang="en-US" sz="2400" b="1" i="1" dirty="0">
+              <a:latin typeface="Arial" panose="020B0604020202020204" pitchFamily="34" charset="0"/>
+              <a:cs typeface="Arial" panose="020B0604020202020204" pitchFamily="34" charset="0"/>
+            </a:endParaRPr>
           </a:p>
           <a:p>
             <a:pPr lvl="1"/>

</xml_diff>

<commit_message>
Added to git slides and removed sub-folder in src
</commit_message>
<xml_diff>
--- a/slides/git_slides.pptx
+++ b/slides/git_slides.pptx
@@ -3838,7 +3838,7 @@
                 <a:latin typeface="Arial" panose="020B0604020202020204" pitchFamily="34" charset="0"/>
                 <a:cs typeface="Arial" panose="020B0604020202020204" pitchFamily="34" charset="0"/>
               </a:rPr>
-              <a:t>Git Workshop for Turner Group</a:t>
+              <a:t>Intro to Git for Turner Group</a:t>
             </a:r>
           </a:p>
         </p:txBody>
@@ -5789,7 +5789,7 @@
                 <a:latin typeface="Arial" panose="020B0604020202020204" pitchFamily="34" charset="0"/>
                 <a:cs typeface="Arial" panose="020B0604020202020204" pitchFamily="34" charset="0"/>
               </a:rPr>
-              <a:t>Check current branch and available branches</a:t>
+              <a:t>Check current branch and other available branches</a:t>
             </a:r>
           </a:p>
           <a:p>
@@ -5843,7 +5843,7 @@
                 <a:latin typeface="Arial" panose="020B0604020202020204" pitchFamily="34" charset="0"/>
                 <a:cs typeface="Arial" panose="020B0604020202020204" pitchFamily="34" charset="0"/>
               </a:rPr>
-              <a:t>Hop to a branch</a:t>
+              <a:t>Hop to the desired branch</a:t>
             </a:r>
           </a:p>
           <a:p>
@@ -6150,6 +6150,19 @@
               <a:latin typeface="Arial" panose="020B0604020202020204" pitchFamily="34" charset="0"/>
               <a:cs typeface="Arial" panose="020B0604020202020204" pitchFamily="34" charset="0"/>
             </a:endParaRPr>
+          </a:p>
+          <a:p>
+            <a:pPr marL="457200" indent="-457200">
+              <a:buFont typeface="+mj-lt"/>
+              <a:buAutoNum type="arabicPeriod" startAt="2"/>
+            </a:pPr>
+            <a:r>
+              <a:rPr lang="en-US" sz="2400" b="1" dirty="0">
+                <a:latin typeface="Arial" panose="020B0604020202020204" pitchFamily="34" charset="0"/>
+                <a:cs typeface="Arial" panose="020B0604020202020204" pitchFamily="34" charset="0"/>
+              </a:rPr>
+              <a:t>Make a branch!</a:t>
+            </a:r>
           </a:p>
           <a:p>
             <a:pPr marL="457200" indent="-457200">

</xml_diff>

<commit_message>
git slides final draft
</commit_message>
<xml_diff>
--- a/slides/git_slides.pptx
+++ b/slides/git_slides.pptx
@@ -5,17 +5,18 @@
     <p:sldMasterId id="2147483648" r:id="rId1"/>
   </p:sldMasterIdLst>
   <p:notesMasterIdLst>
-    <p:notesMasterId r:id="rId10"/>
+    <p:notesMasterId r:id="rId11"/>
   </p:notesMasterIdLst>
   <p:sldIdLst>
     <p:sldId id="420" r:id="rId2"/>
     <p:sldId id="426" r:id="rId3"/>
-    <p:sldId id="419" r:id="rId4"/>
-    <p:sldId id="427" r:id="rId5"/>
-    <p:sldId id="421" r:id="rId6"/>
-    <p:sldId id="422" r:id="rId7"/>
-    <p:sldId id="424" r:id="rId8"/>
-    <p:sldId id="425" r:id="rId9"/>
+    <p:sldId id="428" r:id="rId4"/>
+    <p:sldId id="419" r:id="rId5"/>
+    <p:sldId id="427" r:id="rId6"/>
+    <p:sldId id="421" r:id="rId7"/>
+    <p:sldId id="422" r:id="rId8"/>
+    <p:sldId id="424" r:id="rId9"/>
+    <p:sldId id="425" r:id="rId10"/>
   </p:sldIdLst>
   <p:sldSz cx="12192000" cy="6858000"/>
   <p:notesSz cx="6858000" cy="9144000"/>
@@ -4039,104 +4040,6 @@
           </a:p>
         </p:txBody>
       </p:sp>
-      <p:sp>
-        <p:nvSpPr>
-          <p:cNvPr id="13" name="Content Placeholder 2">
-            <a:extLst>
-              <a:ext uri="{FF2B5EF4-FFF2-40B4-BE49-F238E27FC236}">
-                <a16:creationId xmlns:a16="http://schemas.microsoft.com/office/drawing/2014/main" id="{1BFE9AD7-4024-C425-CA60-826527AD4A67}"/>
-              </a:ext>
-            </a:extLst>
-          </p:cNvPr>
-          <p:cNvSpPr>
-            <a:spLocks noGrp="1"/>
-          </p:cNvSpPr>
-          <p:nvPr>
-            <p:ph idx="1"/>
-          </p:nvPr>
-        </p:nvSpPr>
-        <p:spPr>
-          <a:xfrm>
-            <a:off x="76199" y="851581"/>
-            <a:ext cx="7679872" cy="5731300"/>
-          </a:xfrm>
-          <a:ln>
-            <a:noFill/>
-          </a:ln>
-        </p:spPr>
-        <p:txBody>
-          <a:bodyPr>
-            <a:normAutofit/>
-          </a:bodyPr>
-          <a:lstStyle/>
-          <a:p>
-            <a:r>
-              <a:rPr lang="en-US" sz="2400" b="1" dirty="0">
-                <a:latin typeface="Arial" panose="020B0604020202020204" pitchFamily="34" charset="0"/>
-                <a:cs typeface="Arial" panose="020B0604020202020204" pitchFamily="34" charset="0"/>
-              </a:rPr>
-              <a:t>Version control: </a:t>
-            </a:r>
-            <a:r>
-              <a:rPr lang="en-US" sz="2400" dirty="0">
-                <a:latin typeface="Arial" panose="020B0604020202020204" pitchFamily="34" charset="0"/>
-                <a:cs typeface="Arial" panose="020B0604020202020204" pitchFamily="34" charset="0"/>
-              </a:rPr>
-              <a:t>Saves prior code versions, can revert if needed</a:t>
-            </a:r>
-            <a:endParaRPr lang="en-US" sz="2400" b="1" dirty="0">
-              <a:latin typeface="Arial" panose="020B0604020202020204" pitchFamily="34" charset="0"/>
-              <a:cs typeface="Arial" panose="020B0604020202020204" pitchFamily="34" charset="0"/>
-            </a:endParaRPr>
-          </a:p>
-          <a:p>
-            <a:r>
-              <a:rPr lang="en-US" sz="2400" b="1" dirty="0">
-                <a:latin typeface="Arial" panose="020B0604020202020204" pitchFamily="34" charset="0"/>
-                <a:cs typeface="Arial" panose="020B0604020202020204" pitchFamily="34" charset="0"/>
-              </a:rPr>
-              <a:t>Collaboration</a:t>
-            </a:r>
-            <a:r>
-              <a:rPr lang="en-US" sz="2400" dirty="0">
-                <a:latin typeface="Arial" panose="020B0604020202020204" pitchFamily="34" charset="0"/>
-                <a:cs typeface="Arial" panose="020B0604020202020204" pitchFamily="34" charset="0"/>
-              </a:rPr>
-              <a:t>:</a:t>
-            </a:r>
-            <a:r>
-              <a:rPr lang="en-US" sz="2400" b="1" dirty="0">
-                <a:latin typeface="Arial" panose="020B0604020202020204" pitchFamily="34" charset="0"/>
-                <a:cs typeface="Arial" panose="020B0604020202020204" pitchFamily="34" charset="0"/>
-              </a:rPr>
-              <a:t> </a:t>
-            </a:r>
-            <a:r>
-              <a:rPr lang="en-US" sz="2400" dirty="0">
-                <a:latin typeface="Arial" panose="020B0604020202020204" pitchFamily="34" charset="0"/>
-                <a:cs typeface="Arial" panose="020B0604020202020204" pitchFamily="34" charset="0"/>
-              </a:rPr>
-              <a:t>Team members can edit same codebase in parallel </a:t>
-            </a:r>
-          </a:p>
-          <a:p>
-            <a:r>
-              <a:rPr lang="en-US" sz="2400" b="1" dirty="0">
-                <a:latin typeface="Arial" panose="020B0604020202020204" pitchFamily="34" charset="0"/>
-                <a:cs typeface="Arial" panose="020B0604020202020204" pitchFamily="34" charset="0"/>
-              </a:rPr>
-              <a:t>Accountability</a:t>
-            </a:r>
-            <a:r>
-              <a:rPr lang="en-US" sz="2400" dirty="0">
-                <a:latin typeface="Arial" panose="020B0604020202020204" pitchFamily="34" charset="0"/>
-                <a:cs typeface="Arial" panose="020B0604020202020204" pitchFamily="34" charset="0"/>
-              </a:rPr>
-              <a:t>: Write code that others can read, run, and edit!</a:t>
-            </a:r>
-          </a:p>
-        </p:txBody>
-      </p:sp>
       <p:pic>
         <p:nvPicPr>
           <p:cNvPr id="1026" name="Picture 2" descr="Git">
@@ -4205,6 +4108,286 @@
         <p:cNvPr id="1" name="">
           <a:extLst>
             <a:ext uri="{FF2B5EF4-FFF2-40B4-BE49-F238E27FC236}">
+              <a16:creationId xmlns:a16="http://schemas.microsoft.com/office/drawing/2014/main" id="{F6DCADE1-B29D-F5BE-5593-FE244769AD86}"/>
+            </a:ext>
+          </a:extLst>
+        </p:cNvPr>
+        <p:cNvGrpSpPr/>
+        <p:nvPr/>
+      </p:nvGrpSpPr>
+      <p:grpSpPr>
+        <a:xfrm>
+          <a:off x="0" y="0"/>
+          <a:ext cx="0" cy="0"/>
+          <a:chOff x="0" y="0"/>
+          <a:chExt cx="0" cy="0"/>
+        </a:xfrm>
+      </p:grpSpPr>
+      <p:sp>
+        <p:nvSpPr>
+          <p:cNvPr id="5" name="Slide Number Placeholder 4">
+            <a:extLst>
+              <a:ext uri="{FF2B5EF4-FFF2-40B4-BE49-F238E27FC236}">
+                <a16:creationId xmlns:a16="http://schemas.microsoft.com/office/drawing/2014/main" id="{06CCE97F-EA95-8594-B3AD-A41F18B7F082}"/>
+              </a:ext>
+            </a:extLst>
+          </p:cNvPr>
+          <p:cNvSpPr>
+            <a:spLocks noGrp="1"/>
+          </p:cNvSpPr>
+          <p:nvPr>
+            <p:ph type="sldNum" sz="quarter" idx="12"/>
+          </p:nvPr>
+        </p:nvSpPr>
+        <p:spPr>
+          <a:xfrm>
+            <a:off x="11702143" y="6554206"/>
+            <a:ext cx="489857" cy="365125"/>
+          </a:xfrm>
+        </p:spPr>
+        <p:txBody>
+          <a:bodyPr/>
+          <a:lstStyle/>
+          <a:p>
+            <a:r>
+              <a:rPr lang="en-US" dirty="0">
+                <a:latin typeface="Arial" panose="020B0604020202020204" pitchFamily="34" charset="0"/>
+                <a:cs typeface="Arial" panose="020B0604020202020204" pitchFamily="34" charset="0"/>
+              </a:rPr>
+              <a:t>1</a:t>
+            </a:r>
+          </a:p>
+        </p:txBody>
+      </p:sp>
+      <p:sp>
+        <p:nvSpPr>
+          <p:cNvPr id="8" name="Title 1">
+            <a:extLst>
+              <a:ext uri="{FF2B5EF4-FFF2-40B4-BE49-F238E27FC236}">
+                <a16:creationId xmlns:a16="http://schemas.microsoft.com/office/drawing/2014/main" id="{878BE1AB-AEE7-E965-91BC-86D22D18A65E}"/>
+              </a:ext>
+            </a:extLst>
+          </p:cNvPr>
+          <p:cNvSpPr txBox="1">
+            <a:spLocks/>
+          </p:cNvSpPr>
+          <p:nvPr/>
+        </p:nvSpPr>
+        <p:spPr>
+          <a:xfrm>
+            <a:off x="76199" y="42862"/>
+            <a:ext cx="12039600" cy="701675"/>
+          </a:xfrm>
+          <a:prstGeom prst="rect">
+            <a:avLst/>
+          </a:prstGeom>
+          <a:solidFill>
+            <a:schemeClr val="tx2">
+              <a:lumMod val="10000"/>
+              <a:lumOff val="90000"/>
+            </a:schemeClr>
+          </a:solidFill>
+        </p:spPr>
+        <p:txBody>
+          <a:bodyPr vert="horz" lIns="91440" tIns="45720" rIns="91440" bIns="45720" rtlCol="0" anchor="ctr">
+            <a:normAutofit/>
+          </a:bodyPr>
+          <a:lstStyle>
+            <a:lvl1pPr algn="l" defTabSz="914400" rtl="0" eaLnBrk="1" latinLnBrk="0" hangingPunct="1">
+              <a:lnSpc>
+                <a:spcPct val="90000"/>
+              </a:lnSpc>
+              <a:spcBef>
+                <a:spcPct val="0"/>
+              </a:spcBef>
+              <a:buNone/>
+              <a:defRPr sz="4400" kern="1200">
+                <a:solidFill>
+                  <a:schemeClr val="tx1"/>
+                </a:solidFill>
+                <a:latin typeface="+mj-lt"/>
+                <a:ea typeface="+mj-ea"/>
+                <a:cs typeface="+mj-cs"/>
+              </a:defRPr>
+            </a:lvl1pPr>
+          </a:lstStyle>
+          <a:p>
+            <a:r>
+              <a:rPr lang="en-US" sz="4000" dirty="0">
+                <a:latin typeface="Arial" panose="020B0604020202020204" pitchFamily="34" charset="0"/>
+                <a:cs typeface="Arial" panose="020B0604020202020204" pitchFamily="34" charset="0"/>
+              </a:rPr>
+              <a:t>Why git?</a:t>
+            </a:r>
+          </a:p>
+        </p:txBody>
+      </p:sp>
+      <p:sp>
+        <p:nvSpPr>
+          <p:cNvPr id="13" name="Content Placeholder 2">
+            <a:extLst>
+              <a:ext uri="{FF2B5EF4-FFF2-40B4-BE49-F238E27FC236}">
+                <a16:creationId xmlns:a16="http://schemas.microsoft.com/office/drawing/2014/main" id="{74E73527-A4EF-DD6C-1FBC-58DE4A2E627C}"/>
+              </a:ext>
+            </a:extLst>
+          </p:cNvPr>
+          <p:cNvSpPr>
+            <a:spLocks noGrp="1"/>
+          </p:cNvSpPr>
+          <p:nvPr>
+            <p:ph idx="1"/>
+          </p:nvPr>
+        </p:nvSpPr>
+        <p:spPr>
+          <a:xfrm>
+            <a:off x="76199" y="851581"/>
+            <a:ext cx="7679872" cy="5731300"/>
+          </a:xfrm>
+          <a:ln>
+            <a:noFill/>
+          </a:ln>
+        </p:spPr>
+        <p:txBody>
+          <a:bodyPr>
+            <a:normAutofit/>
+          </a:bodyPr>
+          <a:lstStyle/>
+          <a:p>
+            <a:r>
+              <a:rPr lang="en-US" sz="2400" b="1" dirty="0">
+                <a:latin typeface="Arial" panose="020B0604020202020204" pitchFamily="34" charset="0"/>
+                <a:cs typeface="Arial" panose="020B0604020202020204" pitchFamily="34" charset="0"/>
+              </a:rPr>
+              <a:t>Version control: </a:t>
+            </a:r>
+            <a:r>
+              <a:rPr lang="en-US" sz="2400" dirty="0">
+                <a:latin typeface="Arial" panose="020B0604020202020204" pitchFamily="34" charset="0"/>
+                <a:cs typeface="Arial" panose="020B0604020202020204" pitchFamily="34" charset="0"/>
+              </a:rPr>
+              <a:t>Saves prior code versions, can revert if needed</a:t>
+            </a:r>
+            <a:endParaRPr lang="en-US" sz="2400" b="1" dirty="0">
+              <a:latin typeface="Arial" panose="020B0604020202020204" pitchFamily="34" charset="0"/>
+              <a:cs typeface="Arial" panose="020B0604020202020204" pitchFamily="34" charset="0"/>
+            </a:endParaRPr>
+          </a:p>
+          <a:p>
+            <a:r>
+              <a:rPr lang="en-US" sz="2400" b="1" dirty="0">
+                <a:latin typeface="Arial" panose="020B0604020202020204" pitchFamily="34" charset="0"/>
+                <a:cs typeface="Arial" panose="020B0604020202020204" pitchFamily="34" charset="0"/>
+              </a:rPr>
+              <a:t>Collaboration</a:t>
+            </a:r>
+            <a:r>
+              <a:rPr lang="en-US" sz="2400" dirty="0">
+                <a:latin typeface="Arial" panose="020B0604020202020204" pitchFamily="34" charset="0"/>
+                <a:cs typeface="Arial" panose="020B0604020202020204" pitchFamily="34" charset="0"/>
+              </a:rPr>
+              <a:t>:</a:t>
+            </a:r>
+            <a:r>
+              <a:rPr lang="en-US" sz="2400" b="1" dirty="0">
+                <a:latin typeface="Arial" panose="020B0604020202020204" pitchFamily="34" charset="0"/>
+                <a:cs typeface="Arial" panose="020B0604020202020204" pitchFamily="34" charset="0"/>
+              </a:rPr>
+              <a:t> </a:t>
+            </a:r>
+            <a:r>
+              <a:rPr lang="en-US" sz="2400" dirty="0">
+                <a:latin typeface="Arial" panose="020B0604020202020204" pitchFamily="34" charset="0"/>
+                <a:cs typeface="Arial" panose="020B0604020202020204" pitchFamily="34" charset="0"/>
+              </a:rPr>
+              <a:t>Team members can edit same codebase in parallel </a:t>
+            </a:r>
+          </a:p>
+          <a:p>
+            <a:r>
+              <a:rPr lang="en-US" sz="2400" b="1" dirty="0">
+                <a:latin typeface="Arial" panose="020B0604020202020204" pitchFamily="34" charset="0"/>
+                <a:cs typeface="Arial" panose="020B0604020202020204" pitchFamily="34" charset="0"/>
+              </a:rPr>
+              <a:t>Accountability</a:t>
+            </a:r>
+            <a:r>
+              <a:rPr lang="en-US" sz="2400" dirty="0">
+                <a:latin typeface="Arial" panose="020B0604020202020204" pitchFamily="34" charset="0"/>
+                <a:cs typeface="Arial" panose="020B0604020202020204" pitchFamily="34" charset="0"/>
+              </a:rPr>
+              <a:t>: Write code that others can read, run, and edit!</a:t>
+            </a:r>
+          </a:p>
+        </p:txBody>
+      </p:sp>
+      <p:pic>
+        <p:nvPicPr>
+          <p:cNvPr id="1026" name="Picture 2" descr="Git">
+            <a:extLst>
+              <a:ext uri="{FF2B5EF4-FFF2-40B4-BE49-F238E27FC236}">
+                <a16:creationId xmlns:a16="http://schemas.microsoft.com/office/drawing/2014/main" id="{05D1494B-6641-0BDA-3885-3513C010744D}"/>
+              </a:ext>
+            </a:extLst>
+          </p:cNvPr>
+          <p:cNvPicPr>
+            <a:picLocks noChangeAspect="1" noChangeArrowheads="1"/>
+          </p:cNvPicPr>
+          <p:nvPr/>
+        </p:nvPicPr>
+        <p:blipFill>
+          <a:blip r:embed="rId2">
+            <a:extLst>
+              <a:ext uri="{28A0092B-C50C-407E-A947-70E740481C1C}">
+                <a14:useLocalDpi xmlns:a14="http://schemas.microsoft.com/office/drawing/2010/main" val="0"/>
+              </a:ext>
+            </a:extLst>
+          </a:blip>
+          <a:srcRect/>
+          <a:stretch>
+            <a:fillRect/>
+          </a:stretch>
+        </p:blipFill>
+        <p:spPr bwMode="auto">
+          <a:xfrm>
+            <a:off x="7756071" y="787400"/>
+            <a:ext cx="4191000" cy="6070600"/>
+          </a:xfrm>
+          <a:prstGeom prst="rect">
+            <a:avLst/>
+          </a:prstGeom>
+          <a:noFill/>
+          <a:extLst>
+            <a:ext uri="{909E8E84-426E-40DD-AFC4-6F175D3DCCD1}">
+              <a14:hiddenFill xmlns:a14="http://schemas.microsoft.com/office/drawing/2010/main">
+                <a:solidFill>
+                  <a:srgbClr val="FFFFFF"/>
+                </a:solidFill>
+              </a14:hiddenFill>
+            </a:ext>
+          </a:extLst>
+        </p:spPr>
+      </p:pic>
+    </p:spTree>
+    <p:extLst>
+      <p:ext uri="{BB962C8B-B14F-4D97-AF65-F5344CB8AC3E}">
+        <p14:creationId xmlns:p14="http://schemas.microsoft.com/office/powerpoint/2010/main" val="3592442183"/>
+      </p:ext>
+    </p:extLst>
+  </p:cSld>
+  <p:clrMapOvr>
+    <a:masterClrMapping/>
+  </p:clrMapOvr>
+</p:sld>
+</file>
+
+<file path=ppt/slides/slide4.xml><?xml version="1.0" encoding="utf-8"?>
+<p:sld xmlns:a="http://schemas.openxmlformats.org/drawingml/2006/main" xmlns:r="http://schemas.openxmlformats.org/officeDocument/2006/relationships" xmlns:p="http://schemas.openxmlformats.org/presentationml/2006/main">
+  <p:cSld>
+    <p:spTree>
+      <p:nvGrpSpPr>
+        <p:cNvPr id="1" name="">
+          <a:extLst>
+            <a:ext uri="{FF2B5EF4-FFF2-40B4-BE49-F238E27FC236}">
               <a16:creationId xmlns:a16="http://schemas.microsoft.com/office/drawing/2014/main" id="{7C40243C-87DD-E03A-DC7B-260351DE30C3}"/>
             </a:ext>
           </a:extLst>
@@ -4451,21 +4634,21 @@
                 <a:latin typeface="Arial" panose="020B0604020202020204" pitchFamily="34" charset="0"/>
                 <a:cs typeface="Arial" panose="020B0604020202020204" pitchFamily="34" charset="0"/>
               </a:rPr>
-              <a:t>: local </a:t>
+              <a:t>: </a:t>
             </a:r>
             <a:r>
               <a:rPr lang="en-US" sz="2000" u="sng" dirty="0">
                 <a:latin typeface="Arial" panose="020B0604020202020204" pitchFamily="34" charset="0"/>
                 <a:cs typeface="Arial" panose="020B0604020202020204" pitchFamily="34" charset="0"/>
               </a:rPr>
-              <a:t>software</a:t>
+              <a:t>Software</a:t>
             </a:r>
             <a:r>
               <a:rPr lang="en-US" sz="2000" dirty="0">
                 <a:latin typeface="Arial" panose="020B0604020202020204" pitchFamily="34" charset="0"/>
                 <a:cs typeface="Arial" panose="020B0604020202020204" pitchFamily="34" charset="0"/>
               </a:rPr>
-              <a:t> for managing repositories</a:t>
+              <a:t> for managing LOCAL repositories</a:t>
             </a:r>
           </a:p>
           <a:p>
@@ -4496,7 +4679,7 @@
                 <a:latin typeface="Arial" panose="020B0604020202020204" pitchFamily="34" charset="0"/>
                 <a:cs typeface="Arial" panose="020B0604020202020204" pitchFamily="34" charset="0"/>
               </a:rPr>
-              <a:t>with graphical interface for hosting repositories</a:t>
+              <a:t>with graphical interface for hosting REMOTE repositories</a:t>
             </a:r>
           </a:p>
         </p:txBody>
@@ -4561,7 +4744,7 @@
 </p:sld>
 </file>
 
-<file path=ppt/slides/slide4.xml><?xml version="1.0" encoding="utf-8"?>
+<file path=ppt/slides/slide5.xml><?xml version="1.0" encoding="utf-8"?>
 <p:sld xmlns:a="http://schemas.openxmlformats.org/drawingml/2006/main" xmlns:r="http://schemas.openxmlformats.org/officeDocument/2006/relationships" xmlns:p="http://schemas.openxmlformats.org/presentationml/2006/main">
   <p:cSld>
     <p:spTree>
@@ -4815,21 +4998,21 @@
                 <a:latin typeface="Arial" panose="020B0604020202020204" pitchFamily="34" charset="0"/>
                 <a:cs typeface="Arial" panose="020B0604020202020204" pitchFamily="34" charset="0"/>
               </a:rPr>
-              <a:t>: local </a:t>
+              <a:t>: </a:t>
             </a:r>
             <a:r>
               <a:rPr lang="en-US" sz="2000" u="sng" dirty="0">
                 <a:latin typeface="Arial" panose="020B0604020202020204" pitchFamily="34" charset="0"/>
                 <a:cs typeface="Arial" panose="020B0604020202020204" pitchFamily="34" charset="0"/>
               </a:rPr>
-              <a:t>software</a:t>
+              <a:t>Software</a:t>
             </a:r>
             <a:r>
               <a:rPr lang="en-US" sz="2000" dirty="0">
                 <a:latin typeface="Arial" panose="020B0604020202020204" pitchFamily="34" charset="0"/>
                 <a:cs typeface="Arial" panose="020B0604020202020204" pitchFamily="34" charset="0"/>
               </a:rPr>
-              <a:t> for managing repositories</a:t>
+              <a:t> for managing LOCAL repositories</a:t>
             </a:r>
           </a:p>
           <a:p>
@@ -4860,7 +5043,7 @@
                 <a:latin typeface="Arial" panose="020B0604020202020204" pitchFamily="34" charset="0"/>
                 <a:cs typeface="Arial" panose="020B0604020202020204" pitchFamily="34" charset="0"/>
               </a:rPr>
-              <a:t>with graphical interface for hosting repositories</a:t>
+              <a:t>with graphical interface for hosting REMOTE repositories</a:t>
             </a:r>
           </a:p>
           <a:p>
@@ -4959,7 +5142,7 @@
 </p:sld>
 </file>
 
-<file path=ppt/slides/slide5.xml><?xml version="1.0" encoding="utf-8"?>
+<file path=ppt/slides/slide6.xml><?xml version="1.0" encoding="utf-8"?>
 <p:sld xmlns:a="http://schemas.openxmlformats.org/drawingml/2006/main" xmlns:r="http://schemas.openxmlformats.org/officeDocument/2006/relationships" xmlns:p="http://schemas.openxmlformats.org/presentationml/2006/main">
   <p:cSld>
     <p:spTree>
@@ -5189,7 +5372,7 @@
                 <a:latin typeface="Arial" panose="020B0604020202020204" pitchFamily="34" charset="0"/>
                 <a:cs typeface="Arial" panose="020B0604020202020204" pitchFamily="34" charset="0"/>
               </a:rPr>
-              <a:t>Make parallel edits to code</a:t>
+              <a:t>Make parallel edits to codebase, i.e. adding a new feature</a:t>
             </a:r>
             <a:endParaRPr lang="en-US" sz="2400" b="1" dirty="0">
               <a:latin typeface="Arial" panose="020B0604020202020204" pitchFamily="34" charset="0"/>
@@ -5199,11 +5382,18 @@
           <a:p>
             <a:pPr lvl="1"/>
             <a:r>
+              <a:rPr lang="en-US" sz="2000" b="1" dirty="0">
+                <a:latin typeface="Arial" panose="020B0604020202020204" pitchFamily="34" charset="0"/>
+                <a:cs typeface="Arial" panose="020B0604020202020204" pitchFamily="34" charset="0"/>
+              </a:rPr>
+              <a:t>Main</a:t>
+            </a:r>
+            <a:r>
               <a:rPr lang="en-US" sz="2000" dirty="0">
                 <a:latin typeface="Arial" panose="020B0604020202020204" pitchFamily="34" charset="0"/>
                 <a:cs typeface="Arial" panose="020B0604020202020204" pitchFamily="34" charset="0"/>
               </a:rPr>
-              <a:t>Main: The “production” branch</a:t>
+              <a:t>: The “production” branch</a:t>
             </a:r>
           </a:p>
           <a:p>
@@ -5219,7 +5409,7 @@
                 <a:latin typeface="Arial" panose="020B0604020202020204" pitchFamily="34" charset="0"/>
                 <a:cs typeface="Arial" panose="020B0604020202020204" pitchFamily="34" charset="0"/>
               </a:rPr>
-              <a:t>Repo edit history, “versions”</a:t>
+              <a:t>Repo edit history — “versions”</a:t>
             </a:r>
             <a:endParaRPr lang="en-US" sz="2000" dirty="0">
               <a:latin typeface="Arial" panose="020B0604020202020204" pitchFamily="34" charset="0"/>
@@ -5299,7 +5489,7 @@
 </p:sld>
 </file>
 
-<file path=ppt/slides/slide6.xml><?xml version="1.0" encoding="utf-8"?>
+<file path=ppt/slides/slide7.xml><?xml version="1.0" encoding="utf-8"?>
 <p:sld xmlns:a="http://schemas.openxmlformats.org/drawingml/2006/main" xmlns:r="http://schemas.openxmlformats.org/officeDocument/2006/relationships" xmlns:p="http://schemas.openxmlformats.org/presentationml/2006/main">
   <p:cSld>
     <p:spTree>
@@ -5642,7 +5832,7 @@
 </p:sld>
 </file>
 
-<file path=ppt/slides/slide7.xml><?xml version="1.0" encoding="utf-8"?>
+<file path=ppt/slides/slide8.xml><?xml version="1.0" encoding="utf-8"?>
 <p:sld xmlns:a="http://schemas.openxmlformats.org/drawingml/2006/main" xmlns:r="http://schemas.openxmlformats.org/officeDocument/2006/relationships" xmlns:p="http://schemas.openxmlformats.org/presentationml/2006/main">
   <p:cSld>
     <p:spTree>
@@ -5934,7 +6124,7 @@
 </p:sld>
 </file>
 
-<file path=ppt/slides/slide8.xml><?xml version="1.0" encoding="utf-8"?>
+<file path=ppt/slides/slide9.xml><?xml version="1.0" encoding="utf-8"?>
 <p:sld xmlns:a="http://schemas.openxmlformats.org/drawingml/2006/main" xmlns:r="http://schemas.openxmlformats.org/officeDocument/2006/relationships" xmlns:p="http://schemas.openxmlformats.org/presentationml/2006/main">
   <p:cSld>
     <p:spTree>
@@ -6074,8 +6264,8 @@
         </p:nvSpPr>
         <p:spPr>
           <a:xfrm>
-            <a:off x="76199" y="851581"/>
-            <a:ext cx="12039600" cy="5731300"/>
+            <a:off x="76199" y="851580"/>
+            <a:ext cx="12039600" cy="5963557"/>
           </a:xfrm>
           <a:ln>
             <a:noFill/>
@@ -6083,7 +6273,7 @@
         </p:spPr>
         <p:txBody>
           <a:bodyPr>
-            <a:normAutofit/>
+            <a:noAutofit/>
           </a:bodyPr>
           <a:lstStyle/>
           <a:p>
@@ -6114,35 +6304,35 @@
               <a:buNone/>
             </a:pPr>
             <a:r>
-              <a:rPr lang="en-US" sz="3000" b="1" dirty="0" err="1">
+              <a:rPr lang="en-US" sz="2400" b="1" dirty="0" err="1">
                 <a:latin typeface="Arial" panose="020B0604020202020204" pitchFamily="34" charset="0"/>
                 <a:cs typeface="Arial" panose="020B0604020202020204" pitchFamily="34" charset="0"/>
               </a:rPr>
               <a:t>github.com</a:t>
             </a:r>
             <a:r>
-              <a:rPr lang="en-US" sz="3000" b="1" dirty="0">
+              <a:rPr lang="en-US" sz="2400" b="1" dirty="0">
                 <a:latin typeface="Arial" panose="020B0604020202020204" pitchFamily="34" charset="0"/>
                 <a:cs typeface="Arial" panose="020B0604020202020204" pitchFamily="34" charset="0"/>
               </a:rPr>
               <a:t>/</a:t>
             </a:r>
             <a:r>
-              <a:rPr lang="en-US" sz="3000" b="1" dirty="0" err="1">
+              <a:rPr lang="en-US" sz="2400" b="1" dirty="0" err="1">
                 <a:latin typeface="Arial" panose="020B0604020202020204" pitchFamily="34" charset="0"/>
                 <a:cs typeface="Arial" panose="020B0604020202020204" pitchFamily="34" charset="0"/>
               </a:rPr>
               <a:t>ericjmei</a:t>
             </a:r>
             <a:r>
-              <a:rPr lang="en-US" sz="3000" b="1" dirty="0">
+              <a:rPr lang="en-US" sz="2400" b="1" dirty="0">
                 <a:latin typeface="Arial" panose="020B0604020202020204" pitchFamily="34" charset="0"/>
                 <a:cs typeface="Arial" panose="020B0604020202020204" pitchFamily="34" charset="0"/>
               </a:rPr>
               <a:t>/</a:t>
             </a:r>
             <a:r>
-              <a:rPr lang="en-US" sz="3000" b="1" dirty="0" err="1">
+              <a:rPr lang="en-US" sz="2400" b="1" dirty="0" err="1">
                 <a:latin typeface="Arial" panose="020B0604020202020204" pitchFamily="34" charset="0"/>
                 <a:cs typeface="Arial" panose="020B0604020202020204" pitchFamily="34" charset="0"/>
               </a:rPr>
@@ -6173,7 +6363,7 @@
                 <a:latin typeface="Arial" panose="020B0604020202020204" pitchFamily="34" charset="0"/>
                 <a:cs typeface="Arial" panose="020B0604020202020204" pitchFamily="34" charset="0"/>
               </a:rPr>
-              <a:t>Make a branch!</a:t>
+              <a:t>Make a branch (include your name / username in branch name)!</a:t>
             </a:r>
           </a:p>
           <a:p>
@@ -6190,12 +6380,24 @@
             </a:r>
             <a:r>
               <a:rPr lang="en-US" sz="2400" b="1" i="1" dirty="0" err="1">
+                <a:solidFill>
+                  <a:schemeClr val="tx2">
+                    <a:lumMod val="75000"/>
+                    <a:lumOff val="25000"/>
+                  </a:schemeClr>
+                </a:solidFill>
                 <a:latin typeface="Arial" panose="020B0604020202020204" pitchFamily="34" charset="0"/>
                 <a:cs typeface="Arial" panose="020B0604020202020204" pitchFamily="34" charset="0"/>
               </a:rPr>
               <a:t>git_intro.py</a:t>
             </a:r>
             <a:endParaRPr lang="en-US" sz="2400" b="1" i="1" dirty="0">
+              <a:solidFill>
+                <a:schemeClr val="tx2">
+                  <a:lumMod val="75000"/>
+                  <a:lumOff val="25000"/>
+                </a:schemeClr>
+              </a:solidFill>
               <a:latin typeface="Arial" panose="020B0604020202020204" pitchFamily="34" charset="0"/>
               <a:cs typeface="Arial" panose="020B0604020202020204" pitchFamily="34" charset="0"/>
             </a:endParaRPr>
@@ -6271,6 +6473,19 @@
                 <a:cs typeface="Arial" panose="020B0604020202020204" pitchFamily="34" charset="0"/>
               </a:rPr>
               <a:t>Create a pull request for your branch!</a:t>
+            </a:r>
+          </a:p>
+          <a:p>
+            <a:pPr marL="514350" indent="-514350">
+              <a:buFont typeface="+mj-lt"/>
+              <a:buAutoNum type="arabicPeriod" startAt="4"/>
+            </a:pPr>
+            <a:r>
+              <a:rPr lang="en-US" sz="2400" b="1" dirty="0">
+                <a:latin typeface="Arial" panose="020B0604020202020204" pitchFamily="34" charset="0"/>
+                <a:cs typeface="Arial" panose="020B0604020202020204" pitchFamily="34" charset="0"/>
+              </a:rPr>
+              <a:t>Merge the pull requests into the main branch (as a group)</a:t>
             </a:r>
           </a:p>
         </p:txBody>

</xml_diff>